<commit_message>
update thesis diagram fatima's comments
</commit_message>
<xml_diff>
--- a/figures/outline-of-thesis-diagram.pptx
+++ b/figures/outline-of-thesis-diagram.pptx
@@ -197,7 +197,7 @@
           <a:p>
             <a:fld id="{37E148CC-DA73-F548-877C-ED72E3F2FD52}" type="datetimeFigureOut">
               <a:rPr lang="en-GB" smtClean="0"/>
-              <a:t>05/05/2023</a:t>
+              <a:t>08/05/2023</a:t>
             </a:fld>
             <a:endParaRPr lang="en-GB"/>
           </a:p>
@@ -595,7 +595,7 @@
           <a:p>
             <a:fld id="{964343D4-4BE6-7741-AA6A-EBDD9EB5D27C}" type="datetimeFigureOut">
               <a:rPr lang="en-GB" smtClean="0"/>
-              <a:t>05/05/2023</a:t>
+              <a:t>08/05/2023</a:t>
             </a:fld>
             <a:endParaRPr lang="en-GB"/>
           </a:p>
@@ -765,7 +765,7 @@
           <a:p>
             <a:fld id="{964343D4-4BE6-7741-AA6A-EBDD9EB5D27C}" type="datetimeFigureOut">
               <a:rPr lang="en-GB" smtClean="0"/>
-              <a:t>05/05/2023</a:t>
+              <a:t>08/05/2023</a:t>
             </a:fld>
             <a:endParaRPr lang="en-GB"/>
           </a:p>
@@ -945,7 +945,7 @@
           <a:p>
             <a:fld id="{964343D4-4BE6-7741-AA6A-EBDD9EB5D27C}" type="datetimeFigureOut">
               <a:rPr lang="en-GB" smtClean="0"/>
-              <a:t>05/05/2023</a:t>
+              <a:t>08/05/2023</a:t>
             </a:fld>
             <a:endParaRPr lang="en-GB"/>
           </a:p>
@@ -1115,7 +1115,7 @@
           <a:p>
             <a:fld id="{964343D4-4BE6-7741-AA6A-EBDD9EB5D27C}" type="datetimeFigureOut">
               <a:rPr lang="en-GB" smtClean="0"/>
-              <a:t>05/05/2023</a:t>
+              <a:t>08/05/2023</a:t>
             </a:fld>
             <a:endParaRPr lang="en-GB"/>
           </a:p>
@@ -1359,7 +1359,7 @@
           <a:p>
             <a:fld id="{964343D4-4BE6-7741-AA6A-EBDD9EB5D27C}" type="datetimeFigureOut">
               <a:rPr lang="en-GB" smtClean="0"/>
-              <a:t>05/05/2023</a:t>
+              <a:t>08/05/2023</a:t>
             </a:fld>
             <a:endParaRPr lang="en-GB"/>
           </a:p>
@@ -1591,7 +1591,7 @@
           <a:p>
             <a:fld id="{964343D4-4BE6-7741-AA6A-EBDD9EB5D27C}" type="datetimeFigureOut">
               <a:rPr lang="en-GB" smtClean="0"/>
-              <a:t>05/05/2023</a:t>
+              <a:t>08/05/2023</a:t>
             </a:fld>
             <a:endParaRPr lang="en-GB"/>
           </a:p>
@@ -1958,7 +1958,7 @@
           <a:p>
             <a:fld id="{964343D4-4BE6-7741-AA6A-EBDD9EB5D27C}" type="datetimeFigureOut">
               <a:rPr lang="en-GB" smtClean="0"/>
-              <a:t>05/05/2023</a:t>
+              <a:t>08/05/2023</a:t>
             </a:fld>
             <a:endParaRPr lang="en-GB"/>
           </a:p>
@@ -2076,7 +2076,7 @@
           <a:p>
             <a:fld id="{964343D4-4BE6-7741-AA6A-EBDD9EB5D27C}" type="datetimeFigureOut">
               <a:rPr lang="en-GB" smtClean="0"/>
-              <a:t>05/05/2023</a:t>
+              <a:t>08/05/2023</a:t>
             </a:fld>
             <a:endParaRPr lang="en-GB"/>
           </a:p>
@@ -2171,7 +2171,7 @@
           <a:p>
             <a:fld id="{964343D4-4BE6-7741-AA6A-EBDD9EB5D27C}" type="datetimeFigureOut">
               <a:rPr lang="en-GB" smtClean="0"/>
-              <a:t>05/05/2023</a:t>
+              <a:t>08/05/2023</a:t>
             </a:fld>
             <a:endParaRPr lang="en-GB"/>
           </a:p>
@@ -2448,7 +2448,7 @@
           <a:p>
             <a:fld id="{964343D4-4BE6-7741-AA6A-EBDD9EB5D27C}" type="datetimeFigureOut">
               <a:rPr lang="en-GB" smtClean="0"/>
-              <a:t>05/05/2023</a:t>
+              <a:t>08/05/2023</a:t>
             </a:fld>
             <a:endParaRPr lang="en-GB"/>
           </a:p>
@@ -2705,7 +2705,7 @@
           <a:p>
             <a:fld id="{964343D4-4BE6-7741-AA6A-EBDD9EB5D27C}" type="datetimeFigureOut">
               <a:rPr lang="en-GB" smtClean="0"/>
-              <a:t>05/05/2023</a:t>
+              <a:t>08/05/2023</a:t>
             </a:fld>
             <a:endParaRPr lang="en-GB"/>
           </a:p>
@@ -2918,7 +2918,7 @@
           <a:p>
             <a:fld id="{964343D4-4BE6-7741-AA6A-EBDD9EB5D27C}" type="datetimeFigureOut">
               <a:rPr lang="en-GB" smtClean="0"/>
-              <a:t>05/05/2023</a:t>
+              <a:t>08/05/2023</a:t>
             </a:fld>
             <a:endParaRPr lang="en-GB"/>
           </a:p>
@@ -3325,6 +3325,46 @@
       </p:grpSpPr>
       <p:sp>
         <p:nvSpPr>
+          <p:cNvPr id="13" name="TextBox 12">
+            <a:extLst>
+              <a:ext uri="{FF2B5EF4-FFF2-40B4-BE49-F238E27FC236}">
+                <a16:creationId xmlns:a16="http://schemas.microsoft.com/office/drawing/2014/main" id="{541C47EF-5489-A385-CDC4-713BD8D9F555}"/>
+              </a:ext>
+            </a:extLst>
+          </p:cNvPr>
+          <p:cNvSpPr txBox="1"/>
+          <p:nvPr/>
+        </p:nvSpPr>
+        <p:spPr>
+          <a:xfrm rot="16200000">
+            <a:off x="-2055540" y="6311826"/>
+            <a:ext cx="4371185" cy="369332"/>
+          </a:xfrm>
+          <a:prstGeom prst="rect">
+            <a:avLst/>
+          </a:prstGeom>
+          <a:noFill/>
+        </p:spPr>
+        <p:txBody>
+          <a:bodyPr wrap="square" rtlCol="0">
+            <a:spAutoFit/>
+          </a:bodyPr>
+          <a:lstStyle/>
+          <a:p>
+            <a:pPr algn="ctr"/>
+            <a:r>
+              <a:rPr lang="en-GB" i="1" dirty="0">
+                <a:latin typeface="CMU Serif" panose="02000603000000000000" pitchFamily="2" charset="0"/>
+                <a:ea typeface="CMU Serif" panose="02000603000000000000" pitchFamily="2" charset="0"/>
+                <a:cs typeface="CMU Serif" panose="02000603000000000000" pitchFamily="2" charset="0"/>
+              </a:rPr>
+              <a:t>Novel Contributions</a:t>
+            </a:r>
+          </a:p>
+        </p:txBody>
+      </p:sp>
+      <p:sp>
+        <p:nvSpPr>
           <p:cNvPr id="82" name="TextBox 81">
             <a:extLst>
               <a:ext uri="{FF2B5EF4-FFF2-40B4-BE49-F238E27FC236}">
@@ -3337,7 +3377,7 @@
         </p:nvSpPr>
         <p:spPr>
           <a:xfrm>
-            <a:off x="7585906" y="5387555"/>
+            <a:off x="7530244" y="5384947"/>
             <a:ext cx="2870038" cy="3323987"/>
           </a:xfrm>
           <a:prstGeom prst="rect">
@@ -3442,7 +3482,7 @@
         </p:nvSpPr>
         <p:spPr>
           <a:xfrm>
-            <a:off x="7560874" y="4288648"/>
+            <a:off x="7562393" y="4310899"/>
             <a:ext cx="2895070" cy="1077218"/>
           </a:xfrm>
           <a:prstGeom prst="rect">
@@ -3493,7 +3533,7 @@
         </p:nvSpPr>
         <p:spPr>
           <a:xfrm>
-            <a:off x="4190731" y="4239922"/>
+            <a:off x="3878069" y="4277733"/>
             <a:ext cx="2895070" cy="1077218"/>
           </a:xfrm>
           <a:prstGeom prst="rect">
@@ -3544,7 +3584,7 @@
         </p:nvSpPr>
         <p:spPr>
           <a:xfrm>
-            <a:off x="4219817" y="5392645"/>
+            <a:off x="3934687" y="5411675"/>
             <a:ext cx="2895075" cy="3323987"/>
           </a:xfrm>
           <a:prstGeom prst="rect">
@@ -3638,7 +3678,7 @@
         </p:nvSpPr>
         <p:spPr>
           <a:xfrm>
-            <a:off x="838289" y="5318701"/>
+            <a:off x="361402" y="5384947"/>
             <a:ext cx="2895069" cy="2246769"/>
           </a:xfrm>
           <a:prstGeom prst="rect">
@@ -3716,7 +3756,7 @@
         </p:nvSpPr>
         <p:spPr>
           <a:xfrm>
-            <a:off x="2027163" y="2520519"/>
+            <a:off x="2213612" y="2596296"/>
             <a:ext cx="2895074" cy="1358064"/>
           </a:xfrm>
           <a:prstGeom prst="rect">
@@ -3805,7 +3845,7 @@
         </p:nvSpPr>
         <p:spPr>
           <a:xfrm>
-            <a:off x="4102706" y="108581"/>
+            <a:off x="4102705" y="108581"/>
             <a:ext cx="2594344" cy="1318437"/>
           </a:xfrm>
           <a:prstGeom prst="rect">
@@ -3908,7 +3948,7 @@
         </p:nvSpPr>
         <p:spPr>
           <a:xfrm>
-            <a:off x="2005257" y="1697017"/>
+            <a:off x="2220143" y="1719208"/>
             <a:ext cx="2895075" cy="2234451"/>
           </a:xfrm>
           <a:prstGeom prst="rect">
@@ -3960,8 +4000,8 @@
         </p:nvSpPr>
         <p:spPr>
           <a:xfrm>
-            <a:off x="2027163" y="1701757"/>
-            <a:ext cx="2895075" cy="830997"/>
+            <a:off x="2297383" y="1751092"/>
+            <a:ext cx="2817835" cy="830997"/>
           </a:xfrm>
           <a:prstGeom prst="rect">
             <a:avLst/>
@@ -4011,8 +4051,8 @@
         </p:nvSpPr>
         <p:spPr>
           <a:xfrm>
-            <a:off x="5802049" y="1697018"/>
-            <a:ext cx="2895070" cy="2234450"/>
+            <a:off x="5704219" y="1719209"/>
+            <a:ext cx="2895069" cy="2234450"/>
           </a:xfrm>
           <a:prstGeom prst="rect">
             <a:avLst/>
@@ -4063,8 +4103,8 @@
         </p:nvSpPr>
         <p:spPr>
           <a:xfrm>
-            <a:off x="5834995" y="1706496"/>
-            <a:ext cx="2787238" cy="830997"/>
+            <a:off x="5691154" y="1786017"/>
+            <a:ext cx="2895075" cy="830997"/>
           </a:xfrm>
           <a:prstGeom prst="rect">
             <a:avLst/>
@@ -4116,7 +4156,7 @@
         </p:nvCxnSpPr>
         <p:spPr>
           <a:xfrm>
-            <a:off x="1697553" y="1697018"/>
+            <a:off x="2106185" y="1717062"/>
             <a:ext cx="0" cy="2234450"/>
           </a:xfrm>
           <a:prstGeom prst="straightConnector1">
@@ -4126,7 +4166,8 @@
             <a:solidFill>
               <a:schemeClr val="tx1"/>
             </a:solidFill>
-            <a:tailEnd type="triangle"/>
+            <a:headEnd type="arrow" w="lg" len="med"/>
+            <a:tailEnd type="arrow"/>
           </a:ln>
         </p:spPr>
         <p:style>
@@ -4158,7 +4199,7 @@
         </p:nvSpPr>
         <p:spPr>
           <a:xfrm rot="16200000">
-            <a:off x="230858" y="2601873"/>
+            <a:off x="745862" y="2649621"/>
             <a:ext cx="2234450" cy="369332"/>
           </a:xfrm>
           <a:prstGeom prst="rect">
@@ -4200,7 +4241,7 @@
         </p:nvCxnSpPr>
         <p:spPr>
           <a:xfrm>
-            <a:off x="625157" y="4267626"/>
+            <a:off x="264962" y="4320532"/>
             <a:ext cx="0" cy="4371186"/>
           </a:xfrm>
           <a:prstGeom prst="straightConnector1">
@@ -4210,7 +4251,8 @@
             <a:solidFill>
               <a:schemeClr val="tx1"/>
             </a:solidFill>
-            <a:tailEnd type="triangle"/>
+            <a:headEnd type="arrow" w="lg" len="med"/>
+            <a:tailEnd type="arrow"/>
           </a:ln>
         </p:spPr>
         <p:style>
@@ -4230,46 +4272,6 @@
       </p:cxnSp>
       <p:sp>
         <p:nvSpPr>
-          <p:cNvPr id="13" name="TextBox 12">
-            <a:extLst>
-              <a:ext uri="{FF2B5EF4-FFF2-40B4-BE49-F238E27FC236}">
-                <a16:creationId xmlns:a16="http://schemas.microsoft.com/office/drawing/2014/main" id="{541C47EF-5489-A385-CDC4-713BD8D9F555}"/>
-              </a:ext>
-            </a:extLst>
-          </p:cNvPr>
-          <p:cNvSpPr txBox="1"/>
-          <p:nvPr/>
-        </p:nvSpPr>
-        <p:spPr>
-          <a:xfrm rot="16200000">
-            <a:off x="-1771933" y="6268551"/>
-            <a:ext cx="4371185" cy="369332"/>
-          </a:xfrm>
-          <a:prstGeom prst="rect">
-            <a:avLst/>
-          </a:prstGeom>
-          <a:noFill/>
-        </p:spPr>
-        <p:txBody>
-          <a:bodyPr wrap="square" rtlCol="0">
-            <a:spAutoFit/>
-          </a:bodyPr>
-          <a:lstStyle/>
-          <a:p>
-            <a:pPr algn="ctr"/>
-            <a:r>
-              <a:rPr lang="en-GB" i="1" dirty="0">
-                <a:latin typeface="CMU Serif" panose="02000603000000000000" pitchFamily="2" charset="0"/>
-                <a:ea typeface="CMU Serif" panose="02000603000000000000" pitchFamily="2" charset="0"/>
-                <a:cs typeface="CMU Serif" panose="02000603000000000000" pitchFamily="2" charset="0"/>
-              </a:rPr>
-              <a:t>Novel Contributions</a:t>
-            </a:r>
-          </a:p>
-        </p:txBody>
-      </p:sp>
-      <p:sp>
-        <p:nvSpPr>
           <p:cNvPr id="14" name="Rectangle 13">
             <a:extLst>
               <a:ext uri="{FF2B5EF4-FFF2-40B4-BE49-F238E27FC236}">
@@ -4282,7 +4284,7 @@
         </p:nvSpPr>
         <p:spPr>
           <a:xfrm>
-            <a:off x="827178" y="4267625"/>
+            <a:off x="353630" y="4267626"/>
             <a:ext cx="2895075" cy="4413461"/>
           </a:xfrm>
           <a:prstGeom prst="rect">
@@ -4334,7 +4336,7 @@
         </p:nvSpPr>
         <p:spPr>
           <a:xfrm>
-            <a:off x="4193266" y="4267625"/>
+            <a:off x="3934688" y="4304420"/>
             <a:ext cx="2895075" cy="4398035"/>
           </a:xfrm>
           <a:prstGeom prst="rect">
@@ -4386,7 +4388,7 @@
         </p:nvSpPr>
         <p:spPr>
           <a:xfrm>
-            <a:off x="7560874" y="4283051"/>
+            <a:off x="7517726" y="4305456"/>
             <a:ext cx="2895075" cy="4398035"/>
           </a:xfrm>
           <a:prstGeom prst="rect">
@@ -4438,7 +4440,7 @@
         </p:nvSpPr>
         <p:spPr>
           <a:xfrm>
-            <a:off x="819412" y="4267626"/>
+            <a:off x="345864" y="4267627"/>
             <a:ext cx="2900306" cy="861774"/>
           </a:xfrm>
           <a:prstGeom prst="rect">
@@ -4489,7 +4491,7 @@
         </p:nvSpPr>
         <p:spPr>
           <a:xfrm>
-            <a:off x="4190725" y="9238218"/>
+            <a:off x="3907155" y="9217039"/>
             <a:ext cx="2895075" cy="1410951"/>
           </a:xfrm>
           <a:prstGeom prst="rect">
@@ -4541,7 +4543,7 @@
         </p:nvSpPr>
         <p:spPr>
           <a:xfrm>
-            <a:off x="4190725" y="9286754"/>
+            <a:off x="3907155" y="9220657"/>
             <a:ext cx="2895075" cy="584775"/>
           </a:xfrm>
           <a:prstGeom prst="rect">
@@ -4594,7 +4596,7 @@
         </p:nvCxnSpPr>
         <p:spPr>
           <a:xfrm>
-            <a:off x="2274716" y="8724081"/>
+            <a:off x="1607284" y="8691718"/>
             <a:ext cx="1756649" cy="739444"/>
           </a:xfrm>
           <a:prstGeom prst="straightConnector1">
@@ -4638,7 +4640,7 @@
         </p:nvCxnSpPr>
         <p:spPr>
           <a:xfrm flipH="1">
-            <a:off x="7250617" y="8739507"/>
+            <a:off x="7329917" y="8703614"/>
             <a:ext cx="1757795" cy="723282"/>
           </a:xfrm>
           <a:prstGeom prst="straightConnector1">
@@ -4682,7 +4684,7 @@
         </p:nvCxnSpPr>
         <p:spPr>
           <a:xfrm>
-            <a:off x="5596697" y="8739507"/>
+            <a:off x="5399877" y="8702455"/>
             <a:ext cx="1" cy="424942"/>
           </a:xfrm>
           <a:prstGeom prst="straightConnector1">
@@ -4724,7 +4726,7 @@
         </p:nvSpPr>
         <p:spPr>
           <a:xfrm>
-            <a:off x="4102706" y="618222"/>
+            <a:off x="4102705" y="629679"/>
             <a:ext cx="2594344" cy="711733"/>
           </a:xfrm>
           <a:prstGeom prst="rect">
@@ -4783,7 +4785,7 @@
         </p:nvSpPr>
         <p:spPr>
           <a:xfrm>
-            <a:off x="5802049" y="2514984"/>
+            <a:off x="5717283" y="2585628"/>
             <a:ext cx="2895070" cy="1358064"/>
           </a:xfrm>
           <a:prstGeom prst="rect">
@@ -4871,8 +4873,8 @@
         </p:nvCxnSpPr>
         <p:spPr>
           <a:xfrm>
-            <a:off x="4900332" y="2925549"/>
-            <a:ext cx="794412" cy="0"/>
+            <a:off x="5115218" y="2976013"/>
+            <a:ext cx="486023" cy="0"/>
           </a:xfrm>
           <a:prstGeom prst="straightConnector1">
             <a:avLst/>
@@ -4913,7 +4915,7 @@
         </p:nvSpPr>
         <p:spPr>
           <a:xfrm>
-            <a:off x="4190725" y="9806212"/>
+            <a:off x="3934687" y="9737379"/>
             <a:ext cx="2895075" cy="711733"/>
           </a:xfrm>
           <a:prstGeom prst="rect">
@@ -4974,8 +4976,8 @@
         </p:nvCxnSpPr>
         <p:spPr>
           <a:xfrm>
-            <a:off x="3719718" y="5652620"/>
-            <a:ext cx="347943" cy="0"/>
+            <a:off x="3246170" y="6435920"/>
+            <a:ext cx="618259" cy="0"/>
           </a:xfrm>
           <a:prstGeom prst="straightConnector1">
             <a:avLst/>
@@ -5018,7 +5020,7 @@
         </p:nvCxnSpPr>
         <p:spPr>
           <a:xfrm>
-            <a:off x="3961422" y="3931468"/>
+            <a:off x="3617902" y="3953659"/>
             <a:ext cx="0" cy="323540"/>
           </a:xfrm>
           <a:prstGeom prst="straightConnector1">
@@ -5062,7 +5064,51 @@
         </p:nvCxnSpPr>
         <p:spPr>
           <a:xfrm>
-            <a:off x="7322689" y="3931468"/>
+            <a:off x="7164818" y="3960146"/>
+            <a:ext cx="0" cy="323540"/>
+          </a:xfrm>
+          <a:prstGeom prst="straightConnector1">
+            <a:avLst/>
+          </a:prstGeom>
+          <a:ln>
+            <a:solidFill>
+              <a:schemeClr val="tx1"/>
+            </a:solidFill>
+            <a:tailEnd type="triangle" w="lg" len="med"/>
+          </a:ln>
+        </p:spPr>
+        <p:style>
+          <a:lnRef idx="1">
+            <a:schemeClr val="accent1"/>
+          </a:lnRef>
+          <a:fillRef idx="0">
+            <a:schemeClr val="accent1"/>
+          </a:fillRef>
+          <a:effectRef idx="0">
+            <a:schemeClr val="accent1"/>
+          </a:effectRef>
+          <a:fontRef idx="minor">
+            <a:schemeClr val="tx1"/>
+          </a:fontRef>
+        </p:style>
+      </p:cxnSp>
+      <p:cxnSp>
+        <p:nvCxnSpPr>
+          <p:cNvPr id="27" name="Straight Arrow Connector 26">
+            <a:extLst>
+              <a:ext uri="{FF2B5EF4-FFF2-40B4-BE49-F238E27FC236}">
+                <a16:creationId xmlns:a16="http://schemas.microsoft.com/office/drawing/2014/main" id="{7B2131A8-4DCB-8D2C-4CA3-BA5CB9C128B6}"/>
+              </a:ext>
+            </a:extLst>
+          </p:cNvPr>
+          <p:cNvCxnSpPr>
+            <a:cxnSpLocks/>
+          </p:cNvCxnSpPr>
+          <p:nvPr/>
+        </p:nvCxnSpPr>
+        <p:spPr>
+          <a:xfrm>
+            <a:off x="5399877" y="1427018"/>
             <a:ext cx="0" cy="323540"/>
           </a:xfrm>
           <a:prstGeom prst="straightConnector1">

</xml_diff>

<commit_message>
update outline diagram again
</commit_message>
<xml_diff>
--- a/figures/outline-of-thesis-diagram.pptx
+++ b/figures/outline-of-thesis-diagram.pptx
@@ -2,7 +2,7 @@
 <file path=ppt/presentation.xml><?xml version="1.0" encoding="utf-8"?>
 <p:presentation xmlns:a="http://schemas.openxmlformats.org/drawingml/2006/main" xmlns:r="http://schemas.openxmlformats.org/officeDocument/2006/relationships" xmlns:p="http://schemas.openxmlformats.org/presentationml/2006/main" saveSubsetFonts="1" autoCompressPictures="0">
   <p:sldMasterIdLst>
-    <p:sldMasterId id="2147483684" r:id="rId1"/>
+    <p:sldMasterId id="2147483696" r:id="rId1"/>
   </p:sldMasterIdLst>
   <p:notesMasterIdLst>
     <p:notesMasterId r:id="rId3"/>
@@ -10,7 +10,7 @@
   <p:sldIdLst>
     <p:sldId id="257" r:id="rId2"/>
   </p:sldIdLst>
-  <p:sldSz cx="10799763" cy="11879263"/>
+  <p:sldSz cx="11520488" cy="11879263"/>
   <p:notesSz cx="6858000" cy="9144000"/>
   <p:defaultTextStyle>
     <a:defPPr>
@@ -215,8 +215,8 @@
         </p:nvSpPr>
         <p:spPr>
           <a:xfrm>
-            <a:off x="2025650" y="1143000"/>
-            <a:ext cx="2806700" cy="3086100"/>
+            <a:off x="1933575" y="1143000"/>
+            <a:ext cx="2990850" cy="3086100"/>
           </a:xfrm>
           <a:prstGeom prst="rect">
             <a:avLst/>
@@ -493,15 +493,15 @@
         </p:nvSpPr>
         <p:spPr>
           <a:xfrm>
-            <a:off x="809982" y="1944130"/>
-            <a:ext cx="9179799" cy="4135743"/>
+            <a:off x="864037" y="1944130"/>
+            <a:ext cx="9792415" cy="4135743"/>
           </a:xfrm>
         </p:spPr>
         <p:txBody>
           <a:bodyPr anchor="b"/>
           <a:lstStyle>
             <a:lvl1pPr algn="ctr">
-              <a:defRPr sz="7087"/>
+              <a:defRPr sz="7559"/>
             </a:lvl1pPr>
           </a:lstStyle>
           <a:p>
@@ -525,8 +525,8 @@
         </p:nvSpPr>
         <p:spPr>
           <a:xfrm>
-            <a:off x="1349971" y="6239364"/>
-            <a:ext cx="8099822" cy="2868071"/>
+            <a:off x="1440061" y="6239364"/>
+            <a:ext cx="8640366" cy="2868071"/>
           </a:xfrm>
         </p:spPr>
         <p:txBody>
@@ -534,39 +534,39 @@
           <a:lstStyle>
             <a:lvl1pPr marL="0" indent="0" algn="ctr">
               <a:buNone/>
-              <a:defRPr sz="2835"/>
+              <a:defRPr sz="3024"/>
             </a:lvl1pPr>
-            <a:lvl2pPr marL="539999" indent="0" algn="ctr">
-              <a:buNone/>
-              <a:defRPr sz="2362"/>
+            <a:lvl2pPr marL="576026" indent="0" algn="ctr">
+              <a:buNone/>
+              <a:defRPr sz="2520"/>
             </a:lvl2pPr>
-            <a:lvl3pPr marL="1079998" indent="0" algn="ctr">
-              <a:buNone/>
-              <a:defRPr sz="2126"/>
+            <a:lvl3pPr marL="1152053" indent="0" algn="ctr">
+              <a:buNone/>
+              <a:defRPr sz="2268"/>
             </a:lvl3pPr>
-            <a:lvl4pPr marL="1619997" indent="0" algn="ctr">
-              <a:buNone/>
-              <a:defRPr sz="1890"/>
+            <a:lvl4pPr marL="1728079" indent="0" algn="ctr">
+              <a:buNone/>
+              <a:defRPr sz="2016"/>
             </a:lvl4pPr>
-            <a:lvl5pPr marL="2159996" indent="0" algn="ctr">
-              <a:buNone/>
-              <a:defRPr sz="1890"/>
+            <a:lvl5pPr marL="2304105" indent="0" algn="ctr">
+              <a:buNone/>
+              <a:defRPr sz="2016"/>
             </a:lvl5pPr>
-            <a:lvl6pPr marL="2699995" indent="0" algn="ctr">
-              <a:buNone/>
-              <a:defRPr sz="1890"/>
+            <a:lvl6pPr marL="2880131" indent="0" algn="ctr">
+              <a:buNone/>
+              <a:defRPr sz="2016"/>
             </a:lvl6pPr>
-            <a:lvl7pPr marL="3239994" indent="0" algn="ctr">
-              <a:buNone/>
-              <a:defRPr sz="1890"/>
+            <a:lvl7pPr marL="3456158" indent="0" algn="ctr">
+              <a:buNone/>
+              <a:defRPr sz="2016"/>
             </a:lvl7pPr>
-            <a:lvl8pPr marL="3779992" indent="0" algn="ctr">
-              <a:buNone/>
-              <a:defRPr sz="1890"/>
+            <a:lvl8pPr marL="4032184" indent="0" algn="ctr">
+              <a:buNone/>
+              <a:defRPr sz="2016"/>
             </a:lvl8pPr>
-            <a:lvl9pPr marL="4319991" indent="0" algn="ctr">
-              <a:buNone/>
-              <a:defRPr sz="1890"/>
+            <a:lvl9pPr marL="4608210" indent="0" algn="ctr">
+              <a:buNone/>
+              <a:defRPr sz="2016"/>
             </a:lvl9pPr>
           </a:lstStyle>
           <a:p>
@@ -646,7 +646,7 @@
     </p:spTree>
     <p:extLst>
       <p:ext uri="{BB962C8B-B14F-4D97-AF65-F5344CB8AC3E}">
-        <p14:creationId xmlns:p14="http://schemas.microsoft.com/office/powerpoint/2010/main" val="1084369443"/>
+        <p14:creationId xmlns:p14="http://schemas.microsoft.com/office/powerpoint/2010/main" val="2868421088"/>
       </p:ext>
     </p:extLst>
   </p:cSld>
@@ -816,7 +816,7 @@
     </p:spTree>
     <p:extLst>
       <p:ext uri="{BB962C8B-B14F-4D97-AF65-F5344CB8AC3E}">
-        <p14:creationId xmlns:p14="http://schemas.microsoft.com/office/powerpoint/2010/main" val="3071194253"/>
+        <p14:creationId xmlns:p14="http://schemas.microsoft.com/office/powerpoint/2010/main" val="1022967854"/>
       </p:ext>
     </p:extLst>
   </p:cSld>
@@ -855,8 +855,8 @@
         </p:nvSpPr>
         <p:spPr>
           <a:xfrm>
-            <a:off x="7728581" y="632461"/>
-            <a:ext cx="2328699" cy="10067126"/>
+            <a:off x="8244350" y="632461"/>
+            <a:ext cx="2484105" cy="10067126"/>
           </a:xfrm>
         </p:spPr>
         <p:txBody>
@@ -883,8 +883,8 @@
         </p:nvSpPr>
         <p:spPr>
           <a:xfrm>
-            <a:off x="742484" y="632461"/>
-            <a:ext cx="6851100" cy="10067126"/>
+            <a:off x="792034" y="632461"/>
+            <a:ext cx="7308310" cy="10067126"/>
           </a:xfrm>
         </p:spPr>
         <p:txBody>
@@ -996,7 +996,7 @@
     </p:spTree>
     <p:extLst>
       <p:ext uri="{BB962C8B-B14F-4D97-AF65-F5344CB8AC3E}">
-        <p14:creationId xmlns:p14="http://schemas.microsoft.com/office/powerpoint/2010/main" val="439539680"/>
+        <p14:creationId xmlns:p14="http://schemas.microsoft.com/office/powerpoint/2010/main" val="724915529"/>
       </p:ext>
     </p:extLst>
   </p:cSld>
@@ -1166,7 +1166,7 @@
     </p:spTree>
     <p:extLst>
       <p:ext uri="{BB962C8B-B14F-4D97-AF65-F5344CB8AC3E}">
-        <p14:creationId xmlns:p14="http://schemas.microsoft.com/office/powerpoint/2010/main" val="1963973705"/>
+        <p14:creationId xmlns:p14="http://schemas.microsoft.com/office/powerpoint/2010/main" val="113248051"/>
       </p:ext>
     </p:extLst>
   </p:cSld>
@@ -1205,15 +1205,15 @@
         </p:nvSpPr>
         <p:spPr>
           <a:xfrm>
-            <a:off x="736859" y="2961570"/>
-            <a:ext cx="9314796" cy="4941443"/>
+            <a:off x="786034" y="2961570"/>
+            <a:ext cx="9936421" cy="4941443"/>
           </a:xfrm>
         </p:spPr>
         <p:txBody>
           <a:bodyPr anchor="b"/>
           <a:lstStyle>
             <a:lvl1pPr>
-              <a:defRPr sz="7087"/>
+              <a:defRPr sz="7559"/>
             </a:lvl1pPr>
           </a:lstStyle>
           <a:p>
@@ -1237,8 +1237,8 @@
         </p:nvSpPr>
         <p:spPr>
           <a:xfrm>
-            <a:off x="736859" y="7949760"/>
-            <a:ext cx="9314796" cy="2598588"/>
+            <a:off x="786034" y="7949760"/>
+            <a:ext cx="9936421" cy="2598588"/>
           </a:xfrm>
         </p:spPr>
         <p:txBody>
@@ -1246,15 +1246,15 @@
           <a:lstStyle>
             <a:lvl1pPr marL="0" indent="0">
               <a:buNone/>
-              <a:defRPr sz="2835">
+              <a:defRPr sz="3024">
                 <a:solidFill>
                   <a:schemeClr val="tx1"/>
                 </a:solidFill>
               </a:defRPr>
             </a:lvl1pPr>
-            <a:lvl2pPr marL="539999" indent="0">
-              <a:buNone/>
-              <a:defRPr sz="2362">
+            <a:lvl2pPr marL="576026" indent="0">
+              <a:buNone/>
+              <a:defRPr sz="2520">
                 <a:solidFill>
                   <a:schemeClr val="tx1">
                     <a:tint val="75000"/>
@@ -1262,9 +1262,9 @@
                 </a:solidFill>
               </a:defRPr>
             </a:lvl2pPr>
-            <a:lvl3pPr marL="1079998" indent="0">
-              <a:buNone/>
-              <a:defRPr sz="2126">
+            <a:lvl3pPr marL="1152053" indent="0">
+              <a:buNone/>
+              <a:defRPr sz="2268">
                 <a:solidFill>
                   <a:schemeClr val="tx1">
                     <a:tint val="75000"/>
@@ -1272,9 +1272,9 @@
                 </a:solidFill>
               </a:defRPr>
             </a:lvl3pPr>
-            <a:lvl4pPr marL="1619997" indent="0">
-              <a:buNone/>
-              <a:defRPr sz="1890">
+            <a:lvl4pPr marL="1728079" indent="0">
+              <a:buNone/>
+              <a:defRPr sz="2016">
                 <a:solidFill>
                   <a:schemeClr val="tx1">
                     <a:tint val="75000"/>
@@ -1282,9 +1282,9 @@
                 </a:solidFill>
               </a:defRPr>
             </a:lvl4pPr>
-            <a:lvl5pPr marL="2159996" indent="0">
-              <a:buNone/>
-              <a:defRPr sz="1890">
+            <a:lvl5pPr marL="2304105" indent="0">
+              <a:buNone/>
+              <a:defRPr sz="2016">
                 <a:solidFill>
                   <a:schemeClr val="tx1">
                     <a:tint val="75000"/>
@@ -1292,9 +1292,9 @@
                 </a:solidFill>
               </a:defRPr>
             </a:lvl5pPr>
-            <a:lvl6pPr marL="2699995" indent="0">
-              <a:buNone/>
-              <a:defRPr sz="1890">
+            <a:lvl6pPr marL="2880131" indent="0">
+              <a:buNone/>
+              <a:defRPr sz="2016">
                 <a:solidFill>
                   <a:schemeClr val="tx1">
                     <a:tint val="75000"/>
@@ -1302,9 +1302,9 @@
                 </a:solidFill>
               </a:defRPr>
             </a:lvl6pPr>
-            <a:lvl7pPr marL="3239994" indent="0">
-              <a:buNone/>
-              <a:defRPr sz="1890">
+            <a:lvl7pPr marL="3456158" indent="0">
+              <a:buNone/>
+              <a:defRPr sz="2016">
                 <a:solidFill>
                   <a:schemeClr val="tx1">
                     <a:tint val="75000"/>
@@ -1312,9 +1312,9 @@
                 </a:solidFill>
               </a:defRPr>
             </a:lvl7pPr>
-            <a:lvl8pPr marL="3779992" indent="0">
-              <a:buNone/>
-              <a:defRPr sz="1890">
+            <a:lvl8pPr marL="4032184" indent="0">
+              <a:buNone/>
+              <a:defRPr sz="2016">
                 <a:solidFill>
                   <a:schemeClr val="tx1">
                     <a:tint val="75000"/>
@@ -1322,9 +1322,9 @@
                 </a:solidFill>
               </a:defRPr>
             </a:lvl8pPr>
-            <a:lvl9pPr marL="4319991" indent="0">
-              <a:buNone/>
-              <a:defRPr sz="1890">
+            <a:lvl9pPr marL="4608210" indent="0">
+              <a:buNone/>
+              <a:defRPr sz="2016">
                 <a:solidFill>
                   <a:schemeClr val="tx1">
                     <a:tint val="75000"/>
@@ -1410,7 +1410,7 @@
     </p:spTree>
     <p:extLst>
       <p:ext uri="{BB962C8B-B14F-4D97-AF65-F5344CB8AC3E}">
-        <p14:creationId xmlns:p14="http://schemas.microsoft.com/office/powerpoint/2010/main" val="239309040"/>
+        <p14:creationId xmlns:p14="http://schemas.microsoft.com/office/powerpoint/2010/main" val="529688802"/>
       </p:ext>
     </p:extLst>
   </p:cSld>
@@ -1472,8 +1472,8 @@
         </p:nvSpPr>
         <p:spPr>
           <a:xfrm>
-            <a:off x="742484" y="3162304"/>
-            <a:ext cx="4589899" cy="7537283"/>
+            <a:off x="792034" y="3162304"/>
+            <a:ext cx="4896207" cy="7537283"/>
           </a:xfrm>
         </p:spPr>
         <p:txBody>
@@ -1529,8 +1529,8 @@
         </p:nvSpPr>
         <p:spPr>
           <a:xfrm>
-            <a:off x="5467380" y="3162304"/>
-            <a:ext cx="4589899" cy="7537283"/>
+            <a:off x="5832247" y="3162304"/>
+            <a:ext cx="4896207" cy="7537283"/>
           </a:xfrm>
         </p:spPr>
         <p:txBody>
@@ -1642,7 +1642,7 @@
     </p:spTree>
     <p:extLst>
       <p:ext uri="{BB962C8B-B14F-4D97-AF65-F5344CB8AC3E}">
-        <p14:creationId xmlns:p14="http://schemas.microsoft.com/office/powerpoint/2010/main" val="758160765"/>
+        <p14:creationId xmlns:p14="http://schemas.microsoft.com/office/powerpoint/2010/main" val="2599170824"/>
       </p:ext>
     </p:extLst>
   </p:cSld>
@@ -1681,8 +1681,8 @@
         </p:nvSpPr>
         <p:spPr>
           <a:xfrm>
-            <a:off x="743890" y="632464"/>
-            <a:ext cx="9314796" cy="2296108"/>
+            <a:off x="793534" y="632464"/>
+            <a:ext cx="9936421" cy="2296108"/>
           </a:xfrm>
         </p:spPr>
         <p:txBody>
@@ -1709,8 +1709,8 @@
         </p:nvSpPr>
         <p:spPr>
           <a:xfrm>
-            <a:off x="743892" y="2912070"/>
-            <a:ext cx="4568805" cy="1427161"/>
+            <a:off x="793535" y="2912070"/>
+            <a:ext cx="4873706" cy="1427161"/>
           </a:xfrm>
         </p:spPr>
         <p:txBody>
@@ -1718,39 +1718,39 @@
           <a:lstStyle>
             <a:lvl1pPr marL="0" indent="0">
               <a:buNone/>
-              <a:defRPr sz="2835" b="1"/>
+              <a:defRPr sz="3024" b="1"/>
             </a:lvl1pPr>
-            <a:lvl2pPr marL="539999" indent="0">
-              <a:buNone/>
-              <a:defRPr sz="2362" b="1"/>
+            <a:lvl2pPr marL="576026" indent="0">
+              <a:buNone/>
+              <a:defRPr sz="2520" b="1"/>
             </a:lvl2pPr>
-            <a:lvl3pPr marL="1079998" indent="0">
-              <a:buNone/>
-              <a:defRPr sz="2126" b="1"/>
+            <a:lvl3pPr marL="1152053" indent="0">
+              <a:buNone/>
+              <a:defRPr sz="2268" b="1"/>
             </a:lvl3pPr>
-            <a:lvl4pPr marL="1619997" indent="0">
-              <a:buNone/>
-              <a:defRPr sz="1890" b="1"/>
+            <a:lvl4pPr marL="1728079" indent="0">
+              <a:buNone/>
+              <a:defRPr sz="2016" b="1"/>
             </a:lvl4pPr>
-            <a:lvl5pPr marL="2159996" indent="0">
-              <a:buNone/>
-              <a:defRPr sz="1890" b="1"/>
+            <a:lvl5pPr marL="2304105" indent="0">
+              <a:buNone/>
+              <a:defRPr sz="2016" b="1"/>
             </a:lvl5pPr>
-            <a:lvl6pPr marL="2699995" indent="0">
-              <a:buNone/>
-              <a:defRPr sz="1890" b="1"/>
+            <a:lvl6pPr marL="2880131" indent="0">
+              <a:buNone/>
+              <a:defRPr sz="2016" b="1"/>
             </a:lvl6pPr>
-            <a:lvl7pPr marL="3239994" indent="0">
-              <a:buNone/>
-              <a:defRPr sz="1890" b="1"/>
+            <a:lvl7pPr marL="3456158" indent="0">
+              <a:buNone/>
+              <a:defRPr sz="2016" b="1"/>
             </a:lvl7pPr>
-            <a:lvl8pPr marL="3779992" indent="0">
-              <a:buNone/>
-              <a:defRPr sz="1890" b="1"/>
+            <a:lvl8pPr marL="4032184" indent="0">
+              <a:buNone/>
+              <a:defRPr sz="2016" b="1"/>
             </a:lvl8pPr>
-            <a:lvl9pPr marL="4319991" indent="0">
-              <a:buNone/>
-              <a:defRPr sz="1890" b="1"/>
+            <a:lvl9pPr marL="4608210" indent="0">
+              <a:buNone/>
+              <a:defRPr sz="2016" b="1"/>
             </a:lvl9pPr>
           </a:lstStyle>
           <a:p>
@@ -1774,8 +1774,8 @@
         </p:nvSpPr>
         <p:spPr>
           <a:xfrm>
-            <a:off x="743892" y="4339231"/>
-            <a:ext cx="4568805" cy="6382355"/>
+            <a:off x="793535" y="4339231"/>
+            <a:ext cx="4873706" cy="6382355"/>
           </a:xfrm>
         </p:spPr>
         <p:txBody>
@@ -1831,8 +1831,8 @@
         </p:nvSpPr>
         <p:spPr>
           <a:xfrm>
-            <a:off x="5467381" y="2912070"/>
-            <a:ext cx="4591306" cy="1427161"/>
+            <a:off x="5832248" y="2912070"/>
+            <a:ext cx="4897708" cy="1427161"/>
           </a:xfrm>
         </p:spPr>
         <p:txBody>
@@ -1840,39 +1840,39 @@
           <a:lstStyle>
             <a:lvl1pPr marL="0" indent="0">
               <a:buNone/>
-              <a:defRPr sz="2835" b="1"/>
+              <a:defRPr sz="3024" b="1"/>
             </a:lvl1pPr>
-            <a:lvl2pPr marL="539999" indent="0">
-              <a:buNone/>
-              <a:defRPr sz="2362" b="1"/>
+            <a:lvl2pPr marL="576026" indent="0">
+              <a:buNone/>
+              <a:defRPr sz="2520" b="1"/>
             </a:lvl2pPr>
-            <a:lvl3pPr marL="1079998" indent="0">
-              <a:buNone/>
-              <a:defRPr sz="2126" b="1"/>
+            <a:lvl3pPr marL="1152053" indent="0">
+              <a:buNone/>
+              <a:defRPr sz="2268" b="1"/>
             </a:lvl3pPr>
-            <a:lvl4pPr marL="1619997" indent="0">
-              <a:buNone/>
-              <a:defRPr sz="1890" b="1"/>
+            <a:lvl4pPr marL="1728079" indent="0">
+              <a:buNone/>
+              <a:defRPr sz="2016" b="1"/>
             </a:lvl4pPr>
-            <a:lvl5pPr marL="2159996" indent="0">
-              <a:buNone/>
-              <a:defRPr sz="1890" b="1"/>
+            <a:lvl5pPr marL="2304105" indent="0">
+              <a:buNone/>
+              <a:defRPr sz="2016" b="1"/>
             </a:lvl5pPr>
-            <a:lvl6pPr marL="2699995" indent="0">
-              <a:buNone/>
-              <a:defRPr sz="1890" b="1"/>
+            <a:lvl6pPr marL="2880131" indent="0">
+              <a:buNone/>
+              <a:defRPr sz="2016" b="1"/>
             </a:lvl6pPr>
-            <a:lvl7pPr marL="3239994" indent="0">
-              <a:buNone/>
-              <a:defRPr sz="1890" b="1"/>
+            <a:lvl7pPr marL="3456158" indent="0">
+              <a:buNone/>
+              <a:defRPr sz="2016" b="1"/>
             </a:lvl7pPr>
-            <a:lvl8pPr marL="3779992" indent="0">
-              <a:buNone/>
-              <a:defRPr sz="1890" b="1"/>
+            <a:lvl8pPr marL="4032184" indent="0">
+              <a:buNone/>
+              <a:defRPr sz="2016" b="1"/>
             </a:lvl8pPr>
-            <a:lvl9pPr marL="4319991" indent="0">
-              <a:buNone/>
-              <a:defRPr sz="1890" b="1"/>
+            <a:lvl9pPr marL="4608210" indent="0">
+              <a:buNone/>
+              <a:defRPr sz="2016" b="1"/>
             </a:lvl9pPr>
           </a:lstStyle>
           <a:p>
@@ -1896,8 +1896,8 @@
         </p:nvSpPr>
         <p:spPr>
           <a:xfrm>
-            <a:off x="5467381" y="4339231"/>
-            <a:ext cx="4591306" cy="6382355"/>
+            <a:off x="5832248" y="4339231"/>
+            <a:ext cx="4897708" cy="6382355"/>
           </a:xfrm>
         </p:spPr>
         <p:txBody>
@@ -2009,7 +2009,7 @@
     </p:spTree>
     <p:extLst>
       <p:ext uri="{BB962C8B-B14F-4D97-AF65-F5344CB8AC3E}">
-        <p14:creationId xmlns:p14="http://schemas.microsoft.com/office/powerpoint/2010/main" val="2861160469"/>
+        <p14:creationId xmlns:p14="http://schemas.microsoft.com/office/powerpoint/2010/main" val="2590200947"/>
       </p:ext>
     </p:extLst>
   </p:cSld>
@@ -2127,7 +2127,7 @@
     </p:spTree>
     <p:extLst>
       <p:ext uri="{BB962C8B-B14F-4D97-AF65-F5344CB8AC3E}">
-        <p14:creationId xmlns:p14="http://schemas.microsoft.com/office/powerpoint/2010/main" val="2323812822"/>
+        <p14:creationId xmlns:p14="http://schemas.microsoft.com/office/powerpoint/2010/main" val="2102652839"/>
       </p:ext>
     </p:extLst>
   </p:cSld>
@@ -2222,7 +2222,7 @@
     </p:spTree>
     <p:extLst>
       <p:ext uri="{BB962C8B-B14F-4D97-AF65-F5344CB8AC3E}">
-        <p14:creationId xmlns:p14="http://schemas.microsoft.com/office/powerpoint/2010/main" val="781055801"/>
+        <p14:creationId xmlns:p14="http://schemas.microsoft.com/office/powerpoint/2010/main" val="1248262739"/>
       </p:ext>
     </p:extLst>
   </p:cSld>
@@ -2261,15 +2261,15 @@
         </p:nvSpPr>
         <p:spPr>
           <a:xfrm>
-            <a:off x="743890" y="791951"/>
-            <a:ext cx="3483205" cy="2771828"/>
+            <a:off x="793534" y="791951"/>
+            <a:ext cx="3715657" cy="2771828"/>
           </a:xfrm>
         </p:spPr>
         <p:txBody>
           <a:bodyPr anchor="b"/>
           <a:lstStyle>
             <a:lvl1pPr>
-              <a:defRPr sz="3780"/>
+              <a:defRPr sz="4032"/>
             </a:lvl1pPr>
           </a:lstStyle>
           <a:p>
@@ -2293,39 +2293,39 @@
         </p:nvSpPr>
         <p:spPr>
           <a:xfrm>
-            <a:off x="4591306" y="1710397"/>
-            <a:ext cx="5467380" cy="8441976"/>
+            <a:off x="4897708" y="1710397"/>
+            <a:ext cx="5832247" cy="8441976"/>
           </a:xfrm>
         </p:spPr>
         <p:txBody>
           <a:bodyPr/>
           <a:lstStyle>
             <a:lvl1pPr>
-              <a:defRPr sz="3780"/>
+              <a:defRPr sz="4032"/>
             </a:lvl1pPr>
             <a:lvl2pPr>
-              <a:defRPr sz="3307"/>
+              <a:defRPr sz="3528"/>
             </a:lvl2pPr>
             <a:lvl3pPr>
-              <a:defRPr sz="2835"/>
+              <a:defRPr sz="3024"/>
             </a:lvl3pPr>
             <a:lvl4pPr>
-              <a:defRPr sz="2362"/>
+              <a:defRPr sz="2520"/>
             </a:lvl4pPr>
             <a:lvl5pPr>
-              <a:defRPr sz="2362"/>
+              <a:defRPr sz="2520"/>
             </a:lvl5pPr>
             <a:lvl6pPr>
-              <a:defRPr sz="2362"/>
+              <a:defRPr sz="2520"/>
             </a:lvl6pPr>
             <a:lvl7pPr>
-              <a:defRPr sz="2362"/>
+              <a:defRPr sz="2520"/>
             </a:lvl7pPr>
             <a:lvl8pPr>
-              <a:defRPr sz="2362"/>
+              <a:defRPr sz="2520"/>
             </a:lvl8pPr>
             <a:lvl9pPr>
-              <a:defRPr sz="2362"/>
+              <a:defRPr sz="2520"/>
             </a:lvl9pPr>
           </a:lstStyle>
           <a:p>
@@ -2378,8 +2378,8 @@
         </p:nvSpPr>
         <p:spPr>
           <a:xfrm>
-            <a:off x="743890" y="3563779"/>
-            <a:ext cx="3483205" cy="6602341"/>
+            <a:off x="793534" y="3563779"/>
+            <a:ext cx="3715657" cy="6602341"/>
           </a:xfrm>
         </p:spPr>
         <p:txBody>
@@ -2387,39 +2387,39 @@
           <a:lstStyle>
             <a:lvl1pPr marL="0" indent="0">
               <a:buNone/>
-              <a:defRPr sz="1890"/>
+              <a:defRPr sz="2016"/>
             </a:lvl1pPr>
-            <a:lvl2pPr marL="539999" indent="0">
-              <a:buNone/>
-              <a:defRPr sz="1654"/>
+            <a:lvl2pPr marL="576026" indent="0">
+              <a:buNone/>
+              <a:defRPr sz="1764"/>
             </a:lvl2pPr>
-            <a:lvl3pPr marL="1079998" indent="0">
-              <a:buNone/>
-              <a:defRPr sz="1417"/>
+            <a:lvl3pPr marL="1152053" indent="0">
+              <a:buNone/>
+              <a:defRPr sz="1512"/>
             </a:lvl3pPr>
-            <a:lvl4pPr marL="1619997" indent="0">
-              <a:buNone/>
-              <a:defRPr sz="1181"/>
+            <a:lvl4pPr marL="1728079" indent="0">
+              <a:buNone/>
+              <a:defRPr sz="1260"/>
             </a:lvl4pPr>
-            <a:lvl5pPr marL="2159996" indent="0">
-              <a:buNone/>
-              <a:defRPr sz="1181"/>
+            <a:lvl5pPr marL="2304105" indent="0">
+              <a:buNone/>
+              <a:defRPr sz="1260"/>
             </a:lvl5pPr>
-            <a:lvl6pPr marL="2699995" indent="0">
-              <a:buNone/>
-              <a:defRPr sz="1181"/>
+            <a:lvl6pPr marL="2880131" indent="0">
+              <a:buNone/>
+              <a:defRPr sz="1260"/>
             </a:lvl6pPr>
-            <a:lvl7pPr marL="3239994" indent="0">
-              <a:buNone/>
-              <a:defRPr sz="1181"/>
+            <a:lvl7pPr marL="3456158" indent="0">
+              <a:buNone/>
+              <a:defRPr sz="1260"/>
             </a:lvl7pPr>
-            <a:lvl8pPr marL="3779992" indent="0">
-              <a:buNone/>
-              <a:defRPr sz="1181"/>
+            <a:lvl8pPr marL="4032184" indent="0">
+              <a:buNone/>
+              <a:defRPr sz="1260"/>
             </a:lvl8pPr>
-            <a:lvl9pPr marL="4319991" indent="0">
-              <a:buNone/>
-              <a:defRPr sz="1181"/>
+            <a:lvl9pPr marL="4608210" indent="0">
+              <a:buNone/>
+              <a:defRPr sz="1260"/>
             </a:lvl9pPr>
           </a:lstStyle>
           <a:p>
@@ -2499,7 +2499,7 @@
     </p:spTree>
     <p:extLst>
       <p:ext uri="{BB962C8B-B14F-4D97-AF65-F5344CB8AC3E}">
-        <p14:creationId xmlns:p14="http://schemas.microsoft.com/office/powerpoint/2010/main" val="490181510"/>
+        <p14:creationId xmlns:p14="http://schemas.microsoft.com/office/powerpoint/2010/main" val="2709768060"/>
       </p:ext>
     </p:extLst>
   </p:cSld>
@@ -2538,15 +2538,15 @@
         </p:nvSpPr>
         <p:spPr>
           <a:xfrm>
-            <a:off x="743890" y="791951"/>
-            <a:ext cx="3483205" cy="2771828"/>
+            <a:off x="793534" y="791951"/>
+            <a:ext cx="3715657" cy="2771828"/>
           </a:xfrm>
         </p:spPr>
         <p:txBody>
           <a:bodyPr anchor="b"/>
           <a:lstStyle>
             <a:lvl1pPr>
-              <a:defRPr sz="3780"/>
+              <a:defRPr sz="4032"/>
             </a:lvl1pPr>
           </a:lstStyle>
           <a:p>
@@ -2570,8 +2570,8 @@
         </p:nvSpPr>
         <p:spPr>
           <a:xfrm>
-            <a:off x="4591306" y="1710397"/>
-            <a:ext cx="5467380" cy="8441976"/>
+            <a:off x="4897708" y="1710397"/>
+            <a:ext cx="5832247" cy="8441976"/>
           </a:xfrm>
         </p:spPr>
         <p:txBody>
@@ -2579,39 +2579,39 @@
           <a:lstStyle>
             <a:lvl1pPr marL="0" indent="0">
               <a:buNone/>
-              <a:defRPr sz="3780"/>
+              <a:defRPr sz="4032"/>
             </a:lvl1pPr>
-            <a:lvl2pPr marL="539999" indent="0">
-              <a:buNone/>
-              <a:defRPr sz="3307"/>
+            <a:lvl2pPr marL="576026" indent="0">
+              <a:buNone/>
+              <a:defRPr sz="3528"/>
             </a:lvl2pPr>
-            <a:lvl3pPr marL="1079998" indent="0">
-              <a:buNone/>
-              <a:defRPr sz="2835"/>
+            <a:lvl3pPr marL="1152053" indent="0">
+              <a:buNone/>
+              <a:defRPr sz="3024"/>
             </a:lvl3pPr>
-            <a:lvl4pPr marL="1619997" indent="0">
-              <a:buNone/>
-              <a:defRPr sz="2362"/>
+            <a:lvl4pPr marL="1728079" indent="0">
+              <a:buNone/>
+              <a:defRPr sz="2520"/>
             </a:lvl4pPr>
-            <a:lvl5pPr marL="2159996" indent="0">
-              <a:buNone/>
-              <a:defRPr sz="2362"/>
+            <a:lvl5pPr marL="2304105" indent="0">
+              <a:buNone/>
+              <a:defRPr sz="2520"/>
             </a:lvl5pPr>
-            <a:lvl6pPr marL="2699995" indent="0">
-              <a:buNone/>
-              <a:defRPr sz="2362"/>
+            <a:lvl6pPr marL="2880131" indent="0">
+              <a:buNone/>
+              <a:defRPr sz="2520"/>
             </a:lvl6pPr>
-            <a:lvl7pPr marL="3239994" indent="0">
-              <a:buNone/>
-              <a:defRPr sz="2362"/>
+            <a:lvl7pPr marL="3456158" indent="0">
+              <a:buNone/>
+              <a:defRPr sz="2520"/>
             </a:lvl7pPr>
-            <a:lvl8pPr marL="3779992" indent="0">
-              <a:buNone/>
-              <a:defRPr sz="2362"/>
+            <a:lvl8pPr marL="4032184" indent="0">
+              <a:buNone/>
+              <a:defRPr sz="2520"/>
             </a:lvl8pPr>
-            <a:lvl9pPr marL="4319991" indent="0">
-              <a:buNone/>
-              <a:defRPr sz="2362"/>
+            <a:lvl9pPr marL="4608210" indent="0">
+              <a:buNone/>
+              <a:defRPr sz="2520"/>
             </a:lvl9pPr>
           </a:lstStyle>
           <a:p>
@@ -2635,8 +2635,8 @@
         </p:nvSpPr>
         <p:spPr>
           <a:xfrm>
-            <a:off x="743890" y="3563779"/>
-            <a:ext cx="3483205" cy="6602341"/>
+            <a:off x="793534" y="3563779"/>
+            <a:ext cx="3715657" cy="6602341"/>
           </a:xfrm>
         </p:spPr>
         <p:txBody>
@@ -2644,39 +2644,39 @@
           <a:lstStyle>
             <a:lvl1pPr marL="0" indent="0">
               <a:buNone/>
-              <a:defRPr sz="1890"/>
+              <a:defRPr sz="2016"/>
             </a:lvl1pPr>
-            <a:lvl2pPr marL="539999" indent="0">
-              <a:buNone/>
-              <a:defRPr sz="1654"/>
+            <a:lvl2pPr marL="576026" indent="0">
+              <a:buNone/>
+              <a:defRPr sz="1764"/>
             </a:lvl2pPr>
-            <a:lvl3pPr marL="1079998" indent="0">
-              <a:buNone/>
-              <a:defRPr sz="1417"/>
+            <a:lvl3pPr marL="1152053" indent="0">
+              <a:buNone/>
+              <a:defRPr sz="1512"/>
             </a:lvl3pPr>
-            <a:lvl4pPr marL="1619997" indent="0">
-              <a:buNone/>
-              <a:defRPr sz="1181"/>
+            <a:lvl4pPr marL="1728079" indent="0">
+              <a:buNone/>
+              <a:defRPr sz="1260"/>
             </a:lvl4pPr>
-            <a:lvl5pPr marL="2159996" indent="0">
-              <a:buNone/>
-              <a:defRPr sz="1181"/>
+            <a:lvl5pPr marL="2304105" indent="0">
+              <a:buNone/>
+              <a:defRPr sz="1260"/>
             </a:lvl5pPr>
-            <a:lvl6pPr marL="2699995" indent="0">
-              <a:buNone/>
-              <a:defRPr sz="1181"/>
+            <a:lvl6pPr marL="2880131" indent="0">
+              <a:buNone/>
+              <a:defRPr sz="1260"/>
             </a:lvl6pPr>
-            <a:lvl7pPr marL="3239994" indent="0">
-              <a:buNone/>
-              <a:defRPr sz="1181"/>
+            <a:lvl7pPr marL="3456158" indent="0">
+              <a:buNone/>
+              <a:defRPr sz="1260"/>
             </a:lvl7pPr>
-            <a:lvl8pPr marL="3779992" indent="0">
-              <a:buNone/>
-              <a:defRPr sz="1181"/>
+            <a:lvl8pPr marL="4032184" indent="0">
+              <a:buNone/>
+              <a:defRPr sz="1260"/>
             </a:lvl8pPr>
-            <a:lvl9pPr marL="4319991" indent="0">
-              <a:buNone/>
-              <a:defRPr sz="1181"/>
+            <a:lvl9pPr marL="4608210" indent="0">
+              <a:buNone/>
+              <a:defRPr sz="1260"/>
             </a:lvl9pPr>
           </a:lstStyle>
           <a:p>
@@ -2756,7 +2756,7 @@
     </p:spTree>
     <p:extLst>
       <p:ext uri="{BB962C8B-B14F-4D97-AF65-F5344CB8AC3E}">
-        <p14:creationId xmlns:p14="http://schemas.microsoft.com/office/powerpoint/2010/main" val="4067380493"/>
+        <p14:creationId xmlns:p14="http://schemas.microsoft.com/office/powerpoint/2010/main" val="170253084"/>
       </p:ext>
     </p:extLst>
   </p:cSld>
@@ -2800,8 +2800,8 @@
         </p:nvSpPr>
         <p:spPr>
           <a:xfrm>
-            <a:off x="742484" y="632464"/>
-            <a:ext cx="9314796" cy="2296108"/>
+            <a:off x="792034" y="632464"/>
+            <a:ext cx="9936421" cy="2296108"/>
           </a:xfrm>
           <a:prstGeom prst="rect">
             <a:avLst/>
@@ -2833,8 +2833,8 @@
         </p:nvSpPr>
         <p:spPr>
           <a:xfrm>
-            <a:off x="742484" y="3162304"/>
-            <a:ext cx="9314796" cy="7537283"/>
+            <a:off x="792034" y="3162304"/>
+            <a:ext cx="9936421" cy="7537283"/>
           </a:xfrm>
           <a:prstGeom prst="rect">
             <a:avLst/>
@@ -2895,8 +2895,8 @@
         </p:nvSpPr>
         <p:spPr>
           <a:xfrm>
-            <a:off x="742484" y="11010319"/>
-            <a:ext cx="2429947" cy="632461"/>
+            <a:off x="792033" y="11010319"/>
+            <a:ext cx="2592110" cy="632461"/>
           </a:xfrm>
           <a:prstGeom prst="rect">
             <a:avLst/>
@@ -2906,7 +2906,7 @@
           <a:bodyPr vert="horz" lIns="91440" tIns="45720" rIns="91440" bIns="45720" rtlCol="0" anchor="ctr"/>
           <a:lstStyle>
             <a:lvl1pPr algn="l">
-              <a:defRPr sz="1417">
+              <a:defRPr sz="1512">
                 <a:solidFill>
                   <a:schemeClr val="tx1">
                     <a:tint val="75000"/>
@@ -2936,8 +2936,8 @@
         </p:nvSpPr>
         <p:spPr>
           <a:xfrm>
-            <a:off x="3577422" y="11010319"/>
-            <a:ext cx="3644920" cy="632461"/>
+            <a:off x="3816162" y="11010319"/>
+            <a:ext cx="3888165" cy="632461"/>
           </a:xfrm>
           <a:prstGeom prst="rect">
             <a:avLst/>
@@ -2947,7 +2947,7 @@
           <a:bodyPr vert="horz" lIns="91440" tIns="45720" rIns="91440" bIns="45720" rtlCol="0" anchor="ctr"/>
           <a:lstStyle>
             <a:lvl1pPr algn="ctr">
-              <a:defRPr sz="1417">
+              <a:defRPr sz="1512">
                 <a:solidFill>
                   <a:schemeClr val="tx1">
                     <a:tint val="75000"/>
@@ -2973,8 +2973,8 @@
         </p:nvSpPr>
         <p:spPr>
           <a:xfrm>
-            <a:off x="7627332" y="11010319"/>
-            <a:ext cx="2429947" cy="632461"/>
+            <a:off x="8136345" y="11010319"/>
+            <a:ext cx="2592110" cy="632461"/>
           </a:xfrm>
           <a:prstGeom prst="rect">
             <a:avLst/>
@@ -2984,7 +2984,7 @@
           <a:bodyPr vert="horz" lIns="91440" tIns="45720" rIns="91440" bIns="45720" rtlCol="0" anchor="ctr"/>
           <a:lstStyle>
             <a:lvl1pPr algn="r">
-              <a:defRPr sz="1417">
+              <a:defRPr sz="1512">
                 <a:solidFill>
                   <a:schemeClr val="tx1">
                     <a:tint val="75000"/>
@@ -3005,27 +3005,27 @@
     </p:spTree>
     <p:extLst>
       <p:ext uri="{BB962C8B-B14F-4D97-AF65-F5344CB8AC3E}">
-        <p14:creationId xmlns:p14="http://schemas.microsoft.com/office/powerpoint/2010/main" val="2658982773"/>
+        <p14:creationId xmlns:p14="http://schemas.microsoft.com/office/powerpoint/2010/main" val="1743605712"/>
       </p:ext>
     </p:extLst>
   </p:cSld>
   <p:clrMap bg1="lt1" tx1="dk1" bg2="lt2" tx2="dk2" accent1="accent1" accent2="accent2" accent3="accent3" accent4="accent4" accent5="accent5" accent6="accent6" hlink="hlink" folHlink="folHlink"/>
   <p:sldLayoutIdLst>
-    <p:sldLayoutId id="2147483685" r:id="rId1"/>
-    <p:sldLayoutId id="2147483686" r:id="rId2"/>
-    <p:sldLayoutId id="2147483687" r:id="rId3"/>
-    <p:sldLayoutId id="2147483688" r:id="rId4"/>
-    <p:sldLayoutId id="2147483689" r:id="rId5"/>
-    <p:sldLayoutId id="2147483690" r:id="rId6"/>
-    <p:sldLayoutId id="2147483691" r:id="rId7"/>
-    <p:sldLayoutId id="2147483692" r:id="rId8"/>
-    <p:sldLayoutId id="2147483693" r:id="rId9"/>
-    <p:sldLayoutId id="2147483694" r:id="rId10"/>
-    <p:sldLayoutId id="2147483695" r:id="rId11"/>
+    <p:sldLayoutId id="2147483697" r:id="rId1"/>
+    <p:sldLayoutId id="2147483698" r:id="rId2"/>
+    <p:sldLayoutId id="2147483699" r:id="rId3"/>
+    <p:sldLayoutId id="2147483700" r:id="rId4"/>
+    <p:sldLayoutId id="2147483701" r:id="rId5"/>
+    <p:sldLayoutId id="2147483702" r:id="rId6"/>
+    <p:sldLayoutId id="2147483703" r:id="rId7"/>
+    <p:sldLayoutId id="2147483704" r:id="rId8"/>
+    <p:sldLayoutId id="2147483705" r:id="rId9"/>
+    <p:sldLayoutId id="2147483706" r:id="rId10"/>
+    <p:sldLayoutId id="2147483707" r:id="rId11"/>
   </p:sldLayoutIdLst>
   <p:txStyles>
     <p:titleStyle>
-      <a:lvl1pPr algn="l" defTabSz="1079998" rtl="0" eaLnBrk="1" latinLnBrk="0" hangingPunct="1">
+      <a:lvl1pPr algn="l" defTabSz="1152053" rtl="0" eaLnBrk="1" latinLnBrk="0" hangingPunct="1">
         <a:lnSpc>
           <a:spcPct val="90000"/>
         </a:lnSpc>
@@ -3033,7 +3033,7 @@
           <a:spcPct val="0"/>
         </a:spcBef>
         <a:buNone/>
-        <a:defRPr sz="5197" kern="1200">
+        <a:defRPr sz="5544" kern="1200">
           <a:solidFill>
             <a:schemeClr val="tx1"/>
           </a:solidFill>
@@ -3044,16 +3044,16 @@
       </a:lvl1pPr>
     </p:titleStyle>
     <p:bodyStyle>
-      <a:lvl1pPr marL="269999" indent="-269999" algn="l" defTabSz="1079998" rtl="0" eaLnBrk="1" latinLnBrk="0" hangingPunct="1">
+      <a:lvl1pPr marL="288013" indent="-288013" algn="l" defTabSz="1152053" rtl="0" eaLnBrk="1" latinLnBrk="0" hangingPunct="1">
         <a:lnSpc>
           <a:spcPct val="90000"/>
         </a:lnSpc>
         <a:spcBef>
-          <a:spcPts val="1181"/>
+          <a:spcPts val="1260"/>
         </a:spcBef>
         <a:buFont typeface="Arial" panose="020B0604020202020204" pitchFamily="34" charset="0"/>
         <a:buChar char="•"/>
-        <a:defRPr sz="3307" kern="1200">
+        <a:defRPr sz="3528" kern="1200">
           <a:solidFill>
             <a:schemeClr val="tx1"/>
           </a:solidFill>
@@ -3062,16 +3062,16 @@
           <a:cs typeface="+mn-cs"/>
         </a:defRPr>
       </a:lvl1pPr>
-      <a:lvl2pPr marL="809998" indent="-269999" algn="l" defTabSz="1079998" rtl="0" eaLnBrk="1" latinLnBrk="0" hangingPunct="1">
+      <a:lvl2pPr marL="864039" indent="-288013" algn="l" defTabSz="1152053" rtl="0" eaLnBrk="1" latinLnBrk="0" hangingPunct="1">
         <a:lnSpc>
           <a:spcPct val="90000"/>
         </a:lnSpc>
         <a:spcBef>
-          <a:spcPts val="591"/>
+          <a:spcPts val="630"/>
         </a:spcBef>
         <a:buFont typeface="Arial" panose="020B0604020202020204" pitchFamily="34" charset="0"/>
         <a:buChar char="•"/>
-        <a:defRPr sz="2835" kern="1200">
+        <a:defRPr sz="3024" kern="1200">
           <a:solidFill>
             <a:schemeClr val="tx1"/>
           </a:solidFill>
@@ -3080,16 +3080,16 @@
           <a:cs typeface="+mn-cs"/>
         </a:defRPr>
       </a:lvl2pPr>
-      <a:lvl3pPr marL="1349997" indent="-269999" algn="l" defTabSz="1079998" rtl="0" eaLnBrk="1" latinLnBrk="0" hangingPunct="1">
+      <a:lvl3pPr marL="1440066" indent="-288013" algn="l" defTabSz="1152053" rtl="0" eaLnBrk="1" latinLnBrk="0" hangingPunct="1">
         <a:lnSpc>
           <a:spcPct val="90000"/>
         </a:lnSpc>
         <a:spcBef>
-          <a:spcPts val="591"/>
+          <a:spcPts val="630"/>
         </a:spcBef>
         <a:buFont typeface="Arial" panose="020B0604020202020204" pitchFamily="34" charset="0"/>
         <a:buChar char="•"/>
-        <a:defRPr sz="2362" kern="1200">
+        <a:defRPr sz="2520" kern="1200">
           <a:solidFill>
             <a:schemeClr val="tx1"/>
           </a:solidFill>
@@ -3098,16 +3098,16 @@
           <a:cs typeface="+mn-cs"/>
         </a:defRPr>
       </a:lvl3pPr>
-      <a:lvl4pPr marL="1889996" indent="-269999" algn="l" defTabSz="1079998" rtl="0" eaLnBrk="1" latinLnBrk="0" hangingPunct="1">
+      <a:lvl4pPr marL="2016092" indent="-288013" algn="l" defTabSz="1152053" rtl="0" eaLnBrk="1" latinLnBrk="0" hangingPunct="1">
         <a:lnSpc>
           <a:spcPct val="90000"/>
         </a:lnSpc>
         <a:spcBef>
-          <a:spcPts val="591"/>
+          <a:spcPts val="630"/>
         </a:spcBef>
         <a:buFont typeface="Arial" panose="020B0604020202020204" pitchFamily="34" charset="0"/>
         <a:buChar char="•"/>
-        <a:defRPr sz="2126" kern="1200">
+        <a:defRPr sz="2268" kern="1200">
           <a:solidFill>
             <a:schemeClr val="tx1"/>
           </a:solidFill>
@@ -3116,16 +3116,16 @@
           <a:cs typeface="+mn-cs"/>
         </a:defRPr>
       </a:lvl4pPr>
-      <a:lvl5pPr marL="2429995" indent="-269999" algn="l" defTabSz="1079998" rtl="0" eaLnBrk="1" latinLnBrk="0" hangingPunct="1">
+      <a:lvl5pPr marL="2592118" indent="-288013" algn="l" defTabSz="1152053" rtl="0" eaLnBrk="1" latinLnBrk="0" hangingPunct="1">
         <a:lnSpc>
           <a:spcPct val="90000"/>
         </a:lnSpc>
         <a:spcBef>
-          <a:spcPts val="591"/>
+          <a:spcPts val="630"/>
         </a:spcBef>
         <a:buFont typeface="Arial" panose="020B0604020202020204" pitchFamily="34" charset="0"/>
         <a:buChar char="•"/>
-        <a:defRPr sz="2126" kern="1200">
+        <a:defRPr sz="2268" kern="1200">
           <a:solidFill>
             <a:schemeClr val="tx1"/>
           </a:solidFill>
@@ -3134,16 +3134,16 @@
           <a:cs typeface="+mn-cs"/>
         </a:defRPr>
       </a:lvl5pPr>
-      <a:lvl6pPr marL="2969994" indent="-269999" algn="l" defTabSz="1079998" rtl="0" eaLnBrk="1" latinLnBrk="0" hangingPunct="1">
+      <a:lvl6pPr marL="3168145" indent="-288013" algn="l" defTabSz="1152053" rtl="0" eaLnBrk="1" latinLnBrk="0" hangingPunct="1">
         <a:lnSpc>
           <a:spcPct val="90000"/>
         </a:lnSpc>
         <a:spcBef>
-          <a:spcPts val="591"/>
+          <a:spcPts val="630"/>
         </a:spcBef>
         <a:buFont typeface="Arial" panose="020B0604020202020204" pitchFamily="34" charset="0"/>
         <a:buChar char="•"/>
-        <a:defRPr sz="2126" kern="1200">
+        <a:defRPr sz="2268" kern="1200">
           <a:solidFill>
             <a:schemeClr val="tx1"/>
           </a:solidFill>
@@ -3152,16 +3152,16 @@
           <a:cs typeface="+mn-cs"/>
         </a:defRPr>
       </a:lvl6pPr>
-      <a:lvl7pPr marL="3509993" indent="-269999" algn="l" defTabSz="1079998" rtl="0" eaLnBrk="1" latinLnBrk="0" hangingPunct="1">
+      <a:lvl7pPr marL="3744171" indent="-288013" algn="l" defTabSz="1152053" rtl="0" eaLnBrk="1" latinLnBrk="0" hangingPunct="1">
         <a:lnSpc>
           <a:spcPct val="90000"/>
         </a:lnSpc>
         <a:spcBef>
-          <a:spcPts val="591"/>
+          <a:spcPts val="630"/>
         </a:spcBef>
         <a:buFont typeface="Arial" panose="020B0604020202020204" pitchFamily="34" charset="0"/>
         <a:buChar char="•"/>
-        <a:defRPr sz="2126" kern="1200">
+        <a:defRPr sz="2268" kern="1200">
           <a:solidFill>
             <a:schemeClr val="tx1"/>
           </a:solidFill>
@@ -3170,16 +3170,16 @@
           <a:cs typeface="+mn-cs"/>
         </a:defRPr>
       </a:lvl7pPr>
-      <a:lvl8pPr marL="4049992" indent="-269999" algn="l" defTabSz="1079998" rtl="0" eaLnBrk="1" latinLnBrk="0" hangingPunct="1">
+      <a:lvl8pPr marL="4320197" indent="-288013" algn="l" defTabSz="1152053" rtl="0" eaLnBrk="1" latinLnBrk="0" hangingPunct="1">
         <a:lnSpc>
           <a:spcPct val="90000"/>
         </a:lnSpc>
         <a:spcBef>
-          <a:spcPts val="591"/>
+          <a:spcPts val="630"/>
         </a:spcBef>
         <a:buFont typeface="Arial" panose="020B0604020202020204" pitchFamily="34" charset="0"/>
         <a:buChar char="•"/>
-        <a:defRPr sz="2126" kern="1200">
+        <a:defRPr sz="2268" kern="1200">
           <a:solidFill>
             <a:schemeClr val="tx1"/>
           </a:solidFill>
@@ -3188,16 +3188,16 @@
           <a:cs typeface="+mn-cs"/>
         </a:defRPr>
       </a:lvl8pPr>
-      <a:lvl9pPr marL="4589991" indent="-269999" algn="l" defTabSz="1079998" rtl="0" eaLnBrk="1" latinLnBrk="0" hangingPunct="1">
+      <a:lvl9pPr marL="4896223" indent="-288013" algn="l" defTabSz="1152053" rtl="0" eaLnBrk="1" latinLnBrk="0" hangingPunct="1">
         <a:lnSpc>
           <a:spcPct val="90000"/>
         </a:lnSpc>
         <a:spcBef>
-          <a:spcPts val="591"/>
+          <a:spcPts val="630"/>
         </a:spcBef>
         <a:buFont typeface="Arial" panose="020B0604020202020204" pitchFamily="34" charset="0"/>
         <a:buChar char="•"/>
-        <a:defRPr sz="2126" kern="1200">
+        <a:defRPr sz="2268" kern="1200">
           <a:solidFill>
             <a:schemeClr val="tx1"/>
           </a:solidFill>
@@ -3211,8 +3211,8 @@
       <a:defPPr>
         <a:defRPr lang="en-US"/>
       </a:defPPr>
-      <a:lvl1pPr marL="0" algn="l" defTabSz="1079998" rtl="0" eaLnBrk="1" latinLnBrk="0" hangingPunct="1">
-        <a:defRPr sz="2126" kern="1200">
+      <a:lvl1pPr marL="0" algn="l" defTabSz="1152053" rtl="0" eaLnBrk="1" latinLnBrk="0" hangingPunct="1">
+        <a:defRPr sz="2268" kern="1200">
           <a:solidFill>
             <a:schemeClr val="tx1"/>
           </a:solidFill>
@@ -3221,8 +3221,8 @@
           <a:cs typeface="+mn-cs"/>
         </a:defRPr>
       </a:lvl1pPr>
-      <a:lvl2pPr marL="539999" algn="l" defTabSz="1079998" rtl="0" eaLnBrk="1" latinLnBrk="0" hangingPunct="1">
-        <a:defRPr sz="2126" kern="1200">
+      <a:lvl2pPr marL="576026" algn="l" defTabSz="1152053" rtl="0" eaLnBrk="1" latinLnBrk="0" hangingPunct="1">
+        <a:defRPr sz="2268" kern="1200">
           <a:solidFill>
             <a:schemeClr val="tx1"/>
           </a:solidFill>
@@ -3231,8 +3231,8 @@
           <a:cs typeface="+mn-cs"/>
         </a:defRPr>
       </a:lvl2pPr>
-      <a:lvl3pPr marL="1079998" algn="l" defTabSz="1079998" rtl="0" eaLnBrk="1" latinLnBrk="0" hangingPunct="1">
-        <a:defRPr sz="2126" kern="1200">
+      <a:lvl3pPr marL="1152053" algn="l" defTabSz="1152053" rtl="0" eaLnBrk="1" latinLnBrk="0" hangingPunct="1">
+        <a:defRPr sz="2268" kern="1200">
           <a:solidFill>
             <a:schemeClr val="tx1"/>
           </a:solidFill>
@@ -3241,8 +3241,8 @@
           <a:cs typeface="+mn-cs"/>
         </a:defRPr>
       </a:lvl3pPr>
-      <a:lvl4pPr marL="1619997" algn="l" defTabSz="1079998" rtl="0" eaLnBrk="1" latinLnBrk="0" hangingPunct="1">
-        <a:defRPr sz="2126" kern="1200">
+      <a:lvl4pPr marL="1728079" algn="l" defTabSz="1152053" rtl="0" eaLnBrk="1" latinLnBrk="0" hangingPunct="1">
+        <a:defRPr sz="2268" kern="1200">
           <a:solidFill>
             <a:schemeClr val="tx1"/>
           </a:solidFill>
@@ -3251,8 +3251,8 @@
           <a:cs typeface="+mn-cs"/>
         </a:defRPr>
       </a:lvl4pPr>
-      <a:lvl5pPr marL="2159996" algn="l" defTabSz="1079998" rtl="0" eaLnBrk="1" latinLnBrk="0" hangingPunct="1">
-        <a:defRPr sz="2126" kern="1200">
+      <a:lvl5pPr marL="2304105" algn="l" defTabSz="1152053" rtl="0" eaLnBrk="1" latinLnBrk="0" hangingPunct="1">
+        <a:defRPr sz="2268" kern="1200">
           <a:solidFill>
             <a:schemeClr val="tx1"/>
           </a:solidFill>
@@ -3261,8 +3261,8 @@
           <a:cs typeface="+mn-cs"/>
         </a:defRPr>
       </a:lvl5pPr>
-      <a:lvl6pPr marL="2699995" algn="l" defTabSz="1079998" rtl="0" eaLnBrk="1" latinLnBrk="0" hangingPunct="1">
-        <a:defRPr sz="2126" kern="1200">
+      <a:lvl6pPr marL="2880131" algn="l" defTabSz="1152053" rtl="0" eaLnBrk="1" latinLnBrk="0" hangingPunct="1">
+        <a:defRPr sz="2268" kern="1200">
           <a:solidFill>
             <a:schemeClr val="tx1"/>
           </a:solidFill>
@@ -3271,8 +3271,8 @@
           <a:cs typeface="+mn-cs"/>
         </a:defRPr>
       </a:lvl6pPr>
-      <a:lvl7pPr marL="3239994" algn="l" defTabSz="1079998" rtl="0" eaLnBrk="1" latinLnBrk="0" hangingPunct="1">
-        <a:defRPr sz="2126" kern="1200">
+      <a:lvl7pPr marL="3456158" algn="l" defTabSz="1152053" rtl="0" eaLnBrk="1" latinLnBrk="0" hangingPunct="1">
+        <a:defRPr sz="2268" kern="1200">
           <a:solidFill>
             <a:schemeClr val="tx1"/>
           </a:solidFill>
@@ -3281,8 +3281,8 @@
           <a:cs typeface="+mn-cs"/>
         </a:defRPr>
       </a:lvl7pPr>
-      <a:lvl8pPr marL="3779992" algn="l" defTabSz="1079998" rtl="0" eaLnBrk="1" latinLnBrk="0" hangingPunct="1">
-        <a:defRPr sz="2126" kern="1200">
+      <a:lvl8pPr marL="4032184" algn="l" defTabSz="1152053" rtl="0" eaLnBrk="1" latinLnBrk="0" hangingPunct="1">
+        <a:defRPr sz="2268" kern="1200">
           <a:solidFill>
             <a:schemeClr val="tx1"/>
           </a:solidFill>
@@ -3291,8 +3291,8 @@
           <a:cs typeface="+mn-cs"/>
         </a:defRPr>
       </a:lvl8pPr>
-      <a:lvl9pPr marL="4319991" algn="l" defTabSz="1079998" rtl="0" eaLnBrk="1" latinLnBrk="0" hangingPunct="1">
-        <a:defRPr sz="2126" kern="1200">
+      <a:lvl9pPr marL="4608210" algn="l" defTabSz="1152053" rtl="0" eaLnBrk="1" latinLnBrk="0" hangingPunct="1">
+        <a:defRPr sz="2268" kern="1200">
           <a:solidFill>
             <a:schemeClr val="tx1"/>
           </a:solidFill>
@@ -3337,7 +3337,7 @@
         </p:nvSpPr>
         <p:spPr>
           <a:xfrm rot="16200000">
-            <a:off x="-2055540" y="6311826"/>
+            <a:off x="-1938885" y="6321460"/>
             <a:ext cx="4371185" cy="369332"/>
           </a:xfrm>
           <a:prstGeom prst="rect">
@@ -3377,7 +3377,7 @@
         </p:nvSpPr>
         <p:spPr>
           <a:xfrm>
-            <a:off x="7530244" y="5384947"/>
+            <a:off x="7890607" y="5384948"/>
             <a:ext cx="2870038" cy="3323987"/>
           </a:xfrm>
           <a:prstGeom prst="rect">
@@ -3482,7 +3482,7 @@
         </p:nvSpPr>
         <p:spPr>
           <a:xfrm>
-            <a:off x="7562393" y="4310899"/>
+            <a:off x="7922756" y="4310899"/>
             <a:ext cx="2895070" cy="1077218"/>
           </a:xfrm>
           <a:prstGeom prst="rect">
@@ -3533,7 +3533,7 @@
         </p:nvSpPr>
         <p:spPr>
           <a:xfrm>
-            <a:off x="3878069" y="4277733"/>
+            <a:off x="4238432" y="4277733"/>
             <a:ext cx="2895070" cy="1077218"/>
           </a:xfrm>
           <a:prstGeom prst="rect">
@@ -3584,7 +3584,7 @@
         </p:nvSpPr>
         <p:spPr>
           <a:xfrm>
-            <a:off x="3934687" y="5411675"/>
+            <a:off x="4295051" y="5411676"/>
             <a:ext cx="2895075" cy="3323987"/>
           </a:xfrm>
           <a:prstGeom prst="rect">
@@ -3678,7 +3678,7 @@
         </p:nvSpPr>
         <p:spPr>
           <a:xfrm>
-            <a:off x="361402" y="5384947"/>
+            <a:off x="721766" y="5384948"/>
             <a:ext cx="2895069" cy="2246769"/>
           </a:xfrm>
           <a:prstGeom prst="rect">
@@ -3756,7 +3756,7 @@
         </p:nvSpPr>
         <p:spPr>
           <a:xfrm>
-            <a:off x="2213612" y="2596296"/>
+            <a:off x="2573975" y="2596296"/>
             <a:ext cx="2895074" cy="1358064"/>
           </a:xfrm>
           <a:prstGeom prst="rect">
@@ -3845,7 +3845,7 @@
         </p:nvSpPr>
         <p:spPr>
           <a:xfrm>
-            <a:off x="4102705" y="108581"/>
+            <a:off x="4463068" y="108582"/>
             <a:ext cx="2594344" cy="1318437"/>
           </a:xfrm>
           <a:prstGeom prst="rect">
@@ -3897,7 +3897,7 @@
         </p:nvSpPr>
         <p:spPr>
           <a:xfrm>
-            <a:off x="4437634" y="108581"/>
+            <a:off x="4797998" y="108582"/>
             <a:ext cx="1924493" cy="584775"/>
           </a:xfrm>
           <a:prstGeom prst="rect">
@@ -3948,7 +3948,7 @@
         </p:nvSpPr>
         <p:spPr>
           <a:xfrm>
-            <a:off x="2220143" y="1719208"/>
+            <a:off x="2580507" y="1719209"/>
             <a:ext cx="2895075" cy="2234451"/>
           </a:xfrm>
           <a:prstGeom prst="rect">
@@ -4000,7 +4000,7 @@
         </p:nvSpPr>
         <p:spPr>
           <a:xfrm>
-            <a:off x="2297383" y="1751092"/>
+            <a:off x="2657747" y="1751093"/>
             <a:ext cx="2817835" cy="830997"/>
           </a:xfrm>
           <a:prstGeom prst="rect">
@@ -4051,7 +4051,7 @@
         </p:nvSpPr>
         <p:spPr>
           <a:xfrm>
-            <a:off x="5704219" y="1719209"/>
+            <a:off x="6064583" y="1719209"/>
             <a:ext cx="2895069" cy="2234450"/>
           </a:xfrm>
           <a:prstGeom prst="rect">
@@ -4103,7 +4103,7 @@
         </p:nvSpPr>
         <p:spPr>
           <a:xfrm>
-            <a:off x="5691154" y="1786017"/>
+            <a:off x="6051518" y="1786018"/>
             <a:ext cx="2895075" cy="830997"/>
           </a:xfrm>
           <a:prstGeom prst="rect">
@@ -4156,7 +4156,7 @@
         </p:nvCxnSpPr>
         <p:spPr>
           <a:xfrm>
-            <a:off x="2106185" y="1717062"/>
+            <a:off x="2327630" y="1709242"/>
             <a:ext cx="0" cy="2234450"/>
           </a:xfrm>
           <a:prstGeom prst="straightConnector1">
@@ -4199,7 +4199,7 @@
         </p:nvSpPr>
         <p:spPr>
           <a:xfrm rot="16200000">
-            <a:off x="745862" y="2649621"/>
+            <a:off x="1025739" y="2641801"/>
             <a:ext cx="2234450" cy="369332"/>
           </a:xfrm>
           <a:prstGeom prst="rect">
@@ -4241,7 +4241,7 @@
         </p:nvCxnSpPr>
         <p:spPr>
           <a:xfrm>
-            <a:off x="264962" y="4320532"/>
+            <a:off x="477965" y="4341456"/>
             <a:ext cx="0" cy="4371186"/>
           </a:xfrm>
           <a:prstGeom prst="straightConnector1">
@@ -4284,7 +4284,7 @@
         </p:nvSpPr>
         <p:spPr>
           <a:xfrm>
-            <a:off x="353630" y="4267626"/>
+            <a:off x="713994" y="4267627"/>
             <a:ext cx="2895075" cy="4413461"/>
           </a:xfrm>
           <a:prstGeom prst="rect">
@@ -4336,7 +4336,7 @@
         </p:nvSpPr>
         <p:spPr>
           <a:xfrm>
-            <a:off x="3934688" y="4304420"/>
+            <a:off x="4295052" y="4304421"/>
             <a:ext cx="2895075" cy="4398035"/>
           </a:xfrm>
           <a:prstGeom prst="rect">
@@ -4388,7 +4388,7 @@
         </p:nvSpPr>
         <p:spPr>
           <a:xfrm>
-            <a:off x="7517726" y="4305456"/>
+            <a:off x="7878090" y="4305457"/>
             <a:ext cx="2895075" cy="4398035"/>
           </a:xfrm>
           <a:prstGeom prst="rect">
@@ -4440,7 +4440,7 @@
         </p:nvSpPr>
         <p:spPr>
           <a:xfrm>
-            <a:off x="345864" y="4267627"/>
+            <a:off x="706227" y="4267627"/>
             <a:ext cx="2900306" cy="861774"/>
           </a:xfrm>
           <a:prstGeom prst="rect">
@@ -4491,7 +4491,7 @@
         </p:nvSpPr>
         <p:spPr>
           <a:xfrm>
-            <a:off x="3907155" y="9217039"/>
+            <a:off x="4267519" y="9217040"/>
             <a:ext cx="2895075" cy="1410951"/>
           </a:xfrm>
           <a:prstGeom prst="rect">
@@ -4543,7 +4543,7 @@
         </p:nvSpPr>
         <p:spPr>
           <a:xfrm>
-            <a:off x="3907155" y="9220657"/>
+            <a:off x="4267519" y="9220658"/>
             <a:ext cx="2895075" cy="584775"/>
           </a:xfrm>
           <a:prstGeom prst="rect">
@@ -4596,7 +4596,7 @@
         </p:nvCxnSpPr>
         <p:spPr>
           <a:xfrm>
-            <a:off x="1607284" y="8691718"/>
+            <a:off x="1967648" y="8691718"/>
             <a:ext cx="1756649" cy="739444"/>
           </a:xfrm>
           <a:prstGeom prst="straightConnector1">
@@ -4640,7 +4640,7 @@
         </p:nvCxnSpPr>
         <p:spPr>
           <a:xfrm flipH="1">
-            <a:off x="7329917" y="8703614"/>
+            <a:off x="7690281" y="8703614"/>
             <a:ext cx="1757795" cy="723282"/>
           </a:xfrm>
           <a:prstGeom prst="straightConnector1">
@@ -4684,7 +4684,7 @@
         </p:nvCxnSpPr>
         <p:spPr>
           <a:xfrm>
-            <a:off x="5399877" y="8702455"/>
+            <a:off x="5760241" y="8702455"/>
             <a:ext cx="1" cy="424942"/>
           </a:xfrm>
           <a:prstGeom prst="straightConnector1">
@@ -4726,7 +4726,7 @@
         </p:nvSpPr>
         <p:spPr>
           <a:xfrm>
-            <a:off x="4102705" y="629679"/>
+            <a:off x="4463068" y="629680"/>
             <a:ext cx="2594344" cy="711733"/>
           </a:xfrm>
           <a:prstGeom prst="rect">
@@ -4785,7 +4785,7 @@
         </p:nvSpPr>
         <p:spPr>
           <a:xfrm>
-            <a:off x="5717283" y="2585628"/>
+            <a:off x="6077646" y="2585628"/>
             <a:ext cx="2895070" cy="1358064"/>
           </a:xfrm>
           <a:prstGeom prst="rect">
@@ -4873,7 +4873,7 @@
         </p:nvCxnSpPr>
         <p:spPr>
           <a:xfrm>
-            <a:off x="5115218" y="2976013"/>
+            <a:off x="5475582" y="2976013"/>
             <a:ext cx="486023" cy="0"/>
           </a:xfrm>
           <a:prstGeom prst="straightConnector1">
@@ -4915,7 +4915,7 @@
         </p:nvSpPr>
         <p:spPr>
           <a:xfrm>
-            <a:off x="3934687" y="9737379"/>
+            <a:off x="4295051" y="9737380"/>
             <a:ext cx="2895075" cy="711733"/>
           </a:xfrm>
           <a:prstGeom prst="rect">
@@ -4976,7 +4976,7 @@
         </p:nvCxnSpPr>
         <p:spPr>
           <a:xfrm>
-            <a:off x="3246170" y="6435920"/>
+            <a:off x="3606534" y="6435920"/>
             <a:ext cx="618259" cy="0"/>
           </a:xfrm>
           <a:prstGeom prst="straightConnector1">
@@ -5020,7 +5020,7 @@
         </p:nvCxnSpPr>
         <p:spPr>
           <a:xfrm>
-            <a:off x="3617902" y="3953659"/>
+            <a:off x="3978265" y="3953659"/>
             <a:ext cx="0" cy="323540"/>
           </a:xfrm>
           <a:prstGeom prst="straightConnector1">
@@ -5064,7 +5064,7 @@
         </p:nvCxnSpPr>
         <p:spPr>
           <a:xfrm>
-            <a:off x="7164818" y="3960146"/>
+            <a:off x="7525181" y="3960146"/>
             <a:ext cx="0" cy="323540"/>
           </a:xfrm>
           <a:prstGeom prst="straightConnector1">
@@ -5108,7 +5108,7 @@
         </p:nvCxnSpPr>
         <p:spPr>
           <a:xfrm>
-            <a:off x="5399877" y="1427018"/>
+            <a:off x="5760240" y="1427018"/>
             <a:ext cx="0" cy="323540"/>
           </a:xfrm>
           <a:prstGeom prst="straightConnector1">

</xml_diff>

<commit_message>
update the outline of thesis diagram
</commit_message>
<xml_diff>
--- a/figures/outline-of-thesis-diagram.pptx
+++ b/figures/outline-of-thesis-diagram.pptx
@@ -197,7 +197,7 @@
           <a:p>
             <a:fld id="{37E148CC-DA73-F548-877C-ED72E3F2FD52}" type="datetimeFigureOut">
               <a:rPr lang="en-GB" smtClean="0"/>
-              <a:t>17/07/2023</a:t>
+              <a:t>23/08/2023</a:t>
             </a:fld>
             <a:endParaRPr lang="en-GB"/>
           </a:p>
@@ -595,7 +595,7 @@
           <a:p>
             <a:fld id="{964343D4-4BE6-7741-AA6A-EBDD9EB5D27C}" type="datetimeFigureOut">
               <a:rPr lang="en-GB" smtClean="0"/>
-              <a:t>17/07/2023</a:t>
+              <a:t>23/08/2023</a:t>
             </a:fld>
             <a:endParaRPr lang="en-GB"/>
           </a:p>
@@ -765,7 +765,7 @@
           <a:p>
             <a:fld id="{964343D4-4BE6-7741-AA6A-EBDD9EB5D27C}" type="datetimeFigureOut">
               <a:rPr lang="en-GB" smtClean="0"/>
-              <a:t>17/07/2023</a:t>
+              <a:t>23/08/2023</a:t>
             </a:fld>
             <a:endParaRPr lang="en-GB"/>
           </a:p>
@@ -945,7 +945,7 @@
           <a:p>
             <a:fld id="{964343D4-4BE6-7741-AA6A-EBDD9EB5D27C}" type="datetimeFigureOut">
               <a:rPr lang="en-GB" smtClean="0"/>
-              <a:t>17/07/2023</a:t>
+              <a:t>23/08/2023</a:t>
             </a:fld>
             <a:endParaRPr lang="en-GB"/>
           </a:p>
@@ -1115,7 +1115,7 @@
           <a:p>
             <a:fld id="{964343D4-4BE6-7741-AA6A-EBDD9EB5D27C}" type="datetimeFigureOut">
               <a:rPr lang="en-GB" smtClean="0"/>
-              <a:t>17/07/2023</a:t>
+              <a:t>23/08/2023</a:t>
             </a:fld>
             <a:endParaRPr lang="en-GB"/>
           </a:p>
@@ -1359,7 +1359,7 @@
           <a:p>
             <a:fld id="{964343D4-4BE6-7741-AA6A-EBDD9EB5D27C}" type="datetimeFigureOut">
               <a:rPr lang="en-GB" smtClean="0"/>
-              <a:t>17/07/2023</a:t>
+              <a:t>23/08/2023</a:t>
             </a:fld>
             <a:endParaRPr lang="en-GB"/>
           </a:p>
@@ -1591,7 +1591,7 @@
           <a:p>
             <a:fld id="{964343D4-4BE6-7741-AA6A-EBDD9EB5D27C}" type="datetimeFigureOut">
               <a:rPr lang="en-GB" smtClean="0"/>
-              <a:t>17/07/2023</a:t>
+              <a:t>23/08/2023</a:t>
             </a:fld>
             <a:endParaRPr lang="en-GB"/>
           </a:p>
@@ -1958,7 +1958,7 @@
           <a:p>
             <a:fld id="{964343D4-4BE6-7741-AA6A-EBDD9EB5D27C}" type="datetimeFigureOut">
               <a:rPr lang="en-GB" smtClean="0"/>
-              <a:t>17/07/2023</a:t>
+              <a:t>23/08/2023</a:t>
             </a:fld>
             <a:endParaRPr lang="en-GB"/>
           </a:p>
@@ -2076,7 +2076,7 @@
           <a:p>
             <a:fld id="{964343D4-4BE6-7741-AA6A-EBDD9EB5D27C}" type="datetimeFigureOut">
               <a:rPr lang="en-GB" smtClean="0"/>
-              <a:t>17/07/2023</a:t>
+              <a:t>23/08/2023</a:t>
             </a:fld>
             <a:endParaRPr lang="en-GB"/>
           </a:p>
@@ -2171,7 +2171,7 @@
           <a:p>
             <a:fld id="{964343D4-4BE6-7741-AA6A-EBDD9EB5D27C}" type="datetimeFigureOut">
               <a:rPr lang="en-GB" smtClean="0"/>
-              <a:t>17/07/2023</a:t>
+              <a:t>23/08/2023</a:t>
             </a:fld>
             <a:endParaRPr lang="en-GB"/>
           </a:p>
@@ -2448,7 +2448,7 @@
           <a:p>
             <a:fld id="{964343D4-4BE6-7741-AA6A-EBDD9EB5D27C}" type="datetimeFigureOut">
               <a:rPr lang="en-GB" smtClean="0"/>
-              <a:t>17/07/2023</a:t>
+              <a:t>23/08/2023</a:t>
             </a:fld>
             <a:endParaRPr lang="en-GB"/>
           </a:p>
@@ -2705,7 +2705,7 @@
           <a:p>
             <a:fld id="{964343D4-4BE6-7741-AA6A-EBDD9EB5D27C}" type="datetimeFigureOut">
               <a:rPr lang="en-GB" smtClean="0"/>
-              <a:t>17/07/2023</a:t>
+              <a:t>23/08/2023</a:t>
             </a:fld>
             <a:endParaRPr lang="en-GB"/>
           </a:p>
@@ -2918,7 +2918,7 @@
           <a:p>
             <a:fld id="{964343D4-4BE6-7741-AA6A-EBDD9EB5D27C}" type="datetimeFigureOut">
               <a:rPr lang="en-GB" smtClean="0"/>
-              <a:t>17/07/2023</a:t>
+              <a:t>23/08/2023</a:t>
             </a:fld>
             <a:endParaRPr lang="en-GB"/>
           </a:p>
@@ -3417,7 +3417,7 @@
                 <a:ea typeface="CMU Serif Roman" panose="02000603000000000000" pitchFamily="2" charset="0"/>
                 <a:cs typeface="CMU Serif Roman" panose="02000603000000000000" pitchFamily="2" charset="0"/>
               </a:rPr>
-              <a:t>Development iterative bias-reduction algorithm to improve parameter estimates</a:t>
+              <a:t>Development of iterative bias-reduction algorithm to improve parameter estimates</a:t>
             </a:r>
           </a:p>
           <a:p>
@@ -3455,7 +3455,7 @@
                 <a:ea typeface="CMU Serif Roman" panose="02000603000000000000" pitchFamily="2" charset="0"/>
                 <a:cs typeface="CMU Serif Roman" panose="02000603000000000000" pitchFamily="2" charset="0"/>
               </a:rPr>
-              <a:t>Demonstrations on simulated examples and kinematic data from the RISC dataset</a:t>
+              <a:t>Demonstrations on simulated data and kinematic data from the RISC dataset</a:t>
             </a:r>
           </a:p>
         </p:txBody>
@@ -3576,7 +3576,7 @@
         </p:nvSpPr>
         <p:spPr>
           <a:xfrm>
-            <a:off x="4317382" y="5875738"/>
+            <a:off x="4304473" y="5802398"/>
             <a:ext cx="2860225" cy="3108543"/>
           </a:xfrm>
           <a:prstGeom prst="rect">
@@ -3662,8 +3662,8 @@
         </p:nvSpPr>
         <p:spPr>
           <a:xfrm>
-            <a:off x="736330" y="5678134"/>
-            <a:ext cx="2895069" cy="2462213"/>
+            <a:off x="695429" y="5601696"/>
+            <a:ext cx="2895069" cy="3016210"/>
           </a:xfrm>
           <a:prstGeom prst="rect">
             <a:avLst/>
@@ -3688,7 +3688,7 @@
           </a:p>
           <a:p>
             <a:pPr algn="ctr"/>
-            <a:endParaRPr lang="en-GB" sz="1400" dirty="0">
+            <a:endParaRPr lang="en-GB" sz="1200" dirty="0">
               <a:latin typeface="CMU Serif Roman" panose="02000603000000000000" pitchFamily="2" charset="0"/>
               <a:ea typeface="CMU Serif Roman" panose="02000603000000000000" pitchFamily="2" charset="0"/>
               <a:cs typeface="CMU Serif Roman" panose="02000603000000000000" pitchFamily="2" charset="0"/>
@@ -3702,12 +3702,12 @@
                 <a:ea typeface="CMU Serif Roman" panose="02000603000000000000" pitchFamily="2" charset="0"/>
                 <a:cs typeface="CMU Serif Roman" panose="02000603000000000000" pitchFamily="2" charset="0"/>
               </a:rPr>
-              <a:t>Quantify fixed effects of scalar covariates</a:t>
+              <a:t>The model is used to quantify the fixed effects of scalar covariates and capture dependence among bilateral observations from the same subject</a:t>
             </a:r>
           </a:p>
           <a:p>
             <a:pPr algn="ctr"/>
-            <a:endParaRPr lang="en-GB" sz="1400" dirty="0">
+            <a:endParaRPr lang="en-GB" sz="1000" dirty="0">
               <a:latin typeface="CMU Serif Roman" panose="02000603000000000000" pitchFamily="2" charset="0"/>
               <a:ea typeface="CMU Serif Roman" panose="02000603000000000000" pitchFamily="2" charset="0"/>
               <a:cs typeface="CMU Serif Roman" panose="02000603000000000000" pitchFamily="2" charset="0"/>
@@ -3721,7 +3721,7 @@
                 <a:ea typeface="CMU Serif Roman" panose="02000603000000000000" pitchFamily="2" charset="0"/>
                 <a:cs typeface="CMU Serif Roman" panose="02000603000000000000" pitchFamily="2" charset="0"/>
               </a:rPr>
-              <a:t>Model dependence among bilateral observations from the same subject</a:t>
+              <a:t>New approaches for estimation, inference, summarising and checking the model are proposed</a:t>
             </a:r>
           </a:p>
         </p:txBody>
@@ -4016,7 +4016,7 @@
                 <a:ea typeface="CMU Serif" panose="02000603000000000000" pitchFamily="2" charset="0"/>
                 <a:cs typeface="CMU Serif" panose="02000603000000000000" pitchFamily="2" charset="0"/>
               </a:rPr>
-              <a:t>Statistical Methods for Functional Data</a:t>
+              <a:t>Statistical Methods for Functional Data Analysis</a:t>
             </a:r>
           </a:p>
         </p:txBody>
@@ -4088,7 +4088,7 @@
         <p:spPr>
           <a:xfrm>
             <a:off x="6051519" y="1742134"/>
-            <a:ext cx="2895075" cy="830997"/>
+            <a:ext cx="2895075" cy="1077218"/>
           </a:xfrm>
           <a:prstGeom prst="rect">
             <a:avLst/>
@@ -4119,7 +4119,7 @@
                 <a:ea typeface="CMU Serif" panose="02000603000000000000" pitchFamily="2" charset="0"/>
                 <a:cs typeface="CMU Serif" panose="02000603000000000000" pitchFamily="2" charset="0"/>
               </a:rPr>
-              <a:t>Introduction to the RISC Dataset</a:t>
+              <a:t>The Running Injury Surveillance Centre Dataset</a:t>
             </a:r>
           </a:p>
         </p:txBody>
@@ -4476,7 +4476,7 @@
         <p:spPr>
           <a:xfrm>
             <a:off x="4267519" y="9217040"/>
-            <a:ext cx="2895075" cy="1410951"/>
+            <a:ext cx="2895075" cy="1743060"/>
           </a:xfrm>
           <a:prstGeom prst="rect">
             <a:avLst/>
@@ -4528,7 +4528,7 @@
         <p:spPr>
           <a:xfrm>
             <a:off x="4267519" y="9220658"/>
-            <a:ext cx="2895075" cy="584775"/>
+            <a:ext cx="2895075" cy="830997"/>
           </a:xfrm>
           <a:prstGeom prst="rect">
             <a:avLst/>
@@ -4559,7 +4559,7 @@
                 <a:ea typeface="CMU Serif" panose="02000603000000000000" pitchFamily="2" charset="0"/>
                 <a:cs typeface="CMU Serif" panose="02000603000000000000" pitchFamily="2" charset="0"/>
               </a:rPr>
-              <a:t>Conclusion</a:t>
+              <a:t>Final Remarks and Future Work</a:t>
             </a:r>
           </a:p>
         </p:txBody>
@@ -4769,8 +4769,8 @@
         </p:nvSpPr>
         <p:spPr>
           <a:xfrm>
-            <a:off x="6077646" y="2585628"/>
-            <a:ext cx="2895070" cy="1358064"/>
+            <a:off x="6077646" y="2715488"/>
+            <a:ext cx="2895070" cy="1034899"/>
           </a:xfrm>
           <a:prstGeom prst="rect">
             <a:avLst/>
@@ -4826,18 +4826,6 @@
               </a:rPr>
               <a:t>Landmark Registration</a:t>
             </a:r>
-          </a:p>
-          <a:p>
-            <a:pPr algn="ctr">
-              <a:lnSpc>
-                <a:spcPct val="150000"/>
-              </a:lnSpc>
-            </a:pPr>
-            <a:endParaRPr lang="en-GB" sz="1400" dirty="0">
-              <a:latin typeface="CMU Serif Roman" panose="02000603000000000000" pitchFamily="2" charset="0"/>
-              <a:ea typeface="CMU Serif Roman" panose="02000603000000000000" pitchFamily="2" charset="0"/>
-              <a:cs typeface="CMU Serif Roman" panose="02000603000000000000" pitchFamily="2" charset="0"/>
-            </a:endParaRPr>
           </a:p>
         </p:txBody>
       </p:sp>
@@ -4899,7 +4887,7 @@
         </p:nvSpPr>
         <p:spPr>
           <a:xfrm>
-            <a:off x="4295051" y="9656855"/>
+            <a:off x="4282529" y="9963140"/>
             <a:ext cx="2895075" cy="1034899"/>
           </a:xfrm>
           <a:prstGeom prst="rect">
@@ -4924,7 +4912,7 @@
                 <a:ea typeface="CMU Serif Roman" panose="02000603000000000000" pitchFamily="2" charset="0"/>
                 <a:cs typeface="CMU Serif Roman" panose="02000603000000000000" pitchFamily="2" charset="0"/>
               </a:rPr>
-              <a:t>Summary of Thesis</a:t>
+              <a:t>Summary of the Thesis</a:t>
             </a:r>
           </a:p>
           <a:p>
@@ -4939,7 +4927,7 @@
                 <a:ea typeface="CMU Serif Roman" panose="02000603000000000000" pitchFamily="2" charset="0"/>
                 <a:cs typeface="CMU Serif Roman" panose="02000603000000000000" pitchFamily="2" charset="0"/>
               </a:rPr>
-              <a:t>Future directions</a:t>
+              <a:t>Future Work and Directions</a:t>
             </a:r>
           </a:p>
           <a:p>

</xml_diff>

<commit_message>
update outline of thesis diagram.
</commit_message>
<xml_diff>
--- a/figures/outline-of-thesis-diagram.pptx
+++ b/figures/outline-of-thesis-diagram.pptx
@@ -197,7 +197,7 @@
           <a:p>
             <a:fld id="{37E148CC-DA73-F548-877C-ED72E3F2FD52}" type="datetimeFigureOut">
               <a:rPr lang="en-GB" smtClean="0"/>
-              <a:t>23/08/2023</a:t>
+              <a:t>01/09/2023</a:t>
             </a:fld>
             <a:endParaRPr lang="en-GB"/>
           </a:p>
@@ -595,7 +595,7 @@
           <a:p>
             <a:fld id="{964343D4-4BE6-7741-AA6A-EBDD9EB5D27C}" type="datetimeFigureOut">
               <a:rPr lang="en-GB" smtClean="0"/>
-              <a:t>23/08/2023</a:t>
+              <a:t>01/09/2023</a:t>
             </a:fld>
             <a:endParaRPr lang="en-GB"/>
           </a:p>
@@ -765,7 +765,7 @@
           <a:p>
             <a:fld id="{964343D4-4BE6-7741-AA6A-EBDD9EB5D27C}" type="datetimeFigureOut">
               <a:rPr lang="en-GB" smtClean="0"/>
-              <a:t>23/08/2023</a:t>
+              <a:t>01/09/2023</a:t>
             </a:fld>
             <a:endParaRPr lang="en-GB"/>
           </a:p>
@@ -945,7 +945,7 @@
           <a:p>
             <a:fld id="{964343D4-4BE6-7741-AA6A-EBDD9EB5D27C}" type="datetimeFigureOut">
               <a:rPr lang="en-GB" smtClean="0"/>
-              <a:t>23/08/2023</a:t>
+              <a:t>01/09/2023</a:t>
             </a:fld>
             <a:endParaRPr lang="en-GB"/>
           </a:p>
@@ -1115,7 +1115,7 @@
           <a:p>
             <a:fld id="{964343D4-4BE6-7741-AA6A-EBDD9EB5D27C}" type="datetimeFigureOut">
               <a:rPr lang="en-GB" smtClean="0"/>
-              <a:t>23/08/2023</a:t>
+              <a:t>01/09/2023</a:t>
             </a:fld>
             <a:endParaRPr lang="en-GB"/>
           </a:p>
@@ -1359,7 +1359,7 @@
           <a:p>
             <a:fld id="{964343D4-4BE6-7741-AA6A-EBDD9EB5D27C}" type="datetimeFigureOut">
               <a:rPr lang="en-GB" smtClean="0"/>
-              <a:t>23/08/2023</a:t>
+              <a:t>01/09/2023</a:t>
             </a:fld>
             <a:endParaRPr lang="en-GB"/>
           </a:p>
@@ -1591,7 +1591,7 @@
           <a:p>
             <a:fld id="{964343D4-4BE6-7741-AA6A-EBDD9EB5D27C}" type="datetimeFigureOut">
               <a:rPr lang="en-GB" smtClean="0"/>
-              <a:t>23/08/2023</a:t>
+              <a:t>01/09/2023</a:t>
             </a:fld>
             <a:endParaRPr lang="en-GB"/>
           </a:p>
@@ -1958,7 +1958,7 @@
           <a:p>
             <a:fld id="{964343D4-4BE6-7741-AA6A-EBDD9EB5D27C}" type="datetimeFigureOut">
               <a:rPr lang="en-GB" smtClean="0"/>
-              <a:t>23/08/2023</a:t>
+              <a:t>01/09/2023</a:t>
             </a:fld>
             <a:endParaRPr lang="en-GB"/>
           </a:p>
@@ -2076,7 +2076,7 @@
           <a:p>
             <a:fld id="{964343D4-4BE6-7741-AA6A-EBDD9EB5D27C}" type="datetimeFigureOut">
               <a:rPr lang="en-GB" smtClean="0"/>
-              <a:t>23/08/2023</a:t>
+              <a:t>01/09/2023</a:t>
             </a:fld>
             <a:endParaRPr lang="en-GB"/>
           </a:p>
@@ -2171,7 +2171,7 @@
           <a:p>
             <a:fld id="{964343D4-4BE6-7741-AA6A-EBDD9EB5D27C}" type="datetimeFigureOut">
               <a:rPr lang="en-GB" smtClean="0"/>
-              <a:t>23/08/2023</a:t>
+              <a:t>01/09/2023</a:t>
             </a:fld>
             <a:endParaRPr lang="en-GB"/>
           </a:p>
@@ -2448,7 +2448,7 @@
           <a:p>
             <a:fld id="{964343D4-4BE6-7741-AA6A-EBDD9EB5D27C}" type="datetimeFigureOut">
               <a:rPr lang="en-GB" smtClean="0"/>
-              <a:t>23/08/2023</a:t>
+              <a:t>01/09/2023</a:t>
             </a:fld>
             <a:endParaRPr lang="en-GB"/>
           </a:p>
@@ -2705,7 +2705,7 @@
           <a:p>
             <a:fld id="{964343D4-4BE6-7741-AA6A-EBDD9EB5D27C}" type="datetimeFigureOut">
               <a:rPr lang="en-GB" smtClean="0"/>
-              <a:t>23/08/2023</a:t>
+              <a:t>01/09/2023</a:t>
             </a:fld>
             <a:endParaRPr lang="en-GB"/>
           </a:p>
@@ -2918,7 +2918,7 @@
           <a:p>
             <a:fld id="{964343D4-4BE6-7741-AA6A-EBDD9EB5D27C}" type="datetimeFigureOut">
               <a:rPr lang="en-GB" smtClean="0"/>
-              <a:t>23/08/2023</a:t>
+              <a:t>01/09/2023</a:t>
             </a:fld>
             <a:endParaRPr lang="en-GB"/>
           </a:p>
@@ -3377,7 +3377,7 @@
         </p:nvSpPr>
         <p:spPr>
           <a:xfrm>
-            <a:off x="7890608" y="5583175"/>
+            <a:off x="7890608" y="5493820"/>
             <a:ext cx="2870038" cy="3108543"/>
           </a:xfrm>
           <a:prstGeom prst="rect">
@@ -3576,7 +3576,7 @@
         </p:nvSpPr>
         <p:spPr>
           <a:xfrm>
-            <a:off x="4304473" y="5802398"/>
+            <a:off x="4302369" y="5843063"/>
             <a:ext cx="2860225" cy="3108543"/>
           </a:xfrm>
           <a:prstGeom prst="rect">
@@ -3635,7 +3635,7 @@
                 <a:ea typeface="CMU Serif Roman" panose="02000603000000000000" pitchFamily="2" charset="0"/>
                 <a:cs typeface="CMU Serif Roman" panose="02000603000000000000" pitchFamily="2" charset="0"/>
               </a:rPr>
-              <a:t>Fixed effects of scalar covariates and predictions of individual trajectories</a:t>
+              <a:t>Used to quantify fixed effects of scalar covariates and predict and describe individual trajectories</a:t>
             </a:r>
           </a:p>
           <a:p>

</xml_diff>

<commit_message>
update outline of thesis diagram to remove hyphenation
</commit_message>
<xml_diff>
--- a/figures/outline-of-thesis-diagram.pptx
+++ b/figures/outline-of-thesis-diagram.pptx
@@ -197,7 +197,7 @@
           <a:p>
             <a:fld id="{37E148CC-DA73-F548-877C-ED72E3F2FD52}" type="datetimeFigureOut">
               <a:rPr lang="en-GB" smtClean="0"/>
-              <a:t>01/09/2023</a:t>
+              <a:t>04/09/2023</a:t>
             </a:fld>
             <a:endParaRPr lang="en-GB"/>
           </a:p>
@@ -595,7 +595,7 @@
           <a:p>
             <a:fld id="{964343D4-4BE6-7741-AA6A-EBDD9EB5D27C}" type="datetimeFigureOut">
               <a:rPr lang="en-GB" smtClean="0"/>
-              <a:t>01/09/2023</a:t>
+              <a:t>04/09/2023</a:t>
             </a:fld>
             <a:endParaRPr lang="en-GB"/>
           </a:p>
@@ -765,7 +765,7 @@
           <a:p>
             <a:fld id="{964343D4-4BE6-7741-AA6A-EBDD9EB5D27C}" type="datetimeFigureOut">
               <a:rPr lang="en-GB" smtClean="0"/>
-              <a:t>01/09/2023</a:t>
+              <a:t>04/09/2023</a:t>
             </a:fld>
             <a:endParaRPr lang="en-GB"/>
           </a:p>
@@ -945,7 +945,7 @@
           <a:p>
             <a:fld id="{964343D4-4BE6-7741-AA6A-EBDD9EB5D27C}" type="datetimeFigureOut">
               <a:rPr lang="en-GB" smtClean="0"/>
-              <a:t>01/09/2023</a:t>
+              <a:t>04/09/2023</a:t>
             </a:fld>
             <a:endParaRPr lang="en-GB"/>
           </a:p>
@@ -1115,7 +1115,7 @@
           <a:p>
             <a:fld id="{964343D4-4BE6-7741-AA6A-EBDD9EB5D27C}" type="datetimeFigureOut">
               <a:rPr lang="en-GB" smtClean="0"/>
-              <a:t>01/09/2023</a:t>
+              <a:t>04/09/2023</a:t>
             </a:fld>
             <a:endParaRPr lang="en-GB"/>
           </a:p>
@@ -1359,7 +1359,7 @@
           <a:p>
             <a:fld id="{964343D4-4BE6-7741-AA6A-EBDD9EB5D27C}" type="datetimeFigureOut">
               <a:rPr lang="en-GB" smtClean="0"/>
-              <a:t>01/09/2023</a:t>
+              <a:t>04/09/2023</a:t>
             </a:fld>
             <a:endParaRPr lang="en-GB"/>
           </a:p>
@@ -1591,7 +1591,7 @@
           <a:p>
             <a:fld id="{964343D4-4BE6-7741-AA6A-EBDD9EB5D27C}" type="datetimeFigureOut">
               <a:rPr lang="en-GB" smtClean="0"/>
-              <a:t>01/09/2023</a:t>
+              <a:t>04/09/2023</a:t>
             </a:fld>
             <a:endParaRPr lang="en-GB"/>
           </a:p>
@@ -1958,7 +1958,7 @@
           <a:p>
             <a:fld id="{964343D4-4BE6-7741-AA6A-EBDD9EB5D27C}" type="datetimeFigureOut">
               <a:rPr lang="en-GB" smtClean="0"/>
-              <a:t>01/09/2023</a:t>
+              <a:t>04/09/2023</a:t>
             </a:fld>
             <a:endParaRPr lang="en-GB"/>
           </a:p>
@@ -2076,7 +2076,7 @@
           <a:p>
             <a:fld id="{964343D4-4BE6-7741-AA6A-EBDD9EB5D27C}" type="datetimeFigureOut">
               <a:rPr lang="en-GB" smtClean="0"/>
-              <a:t>01/09/2023</a:t>
+              <a:t>04/09/2023</a:t>
             </a:fld>
             <a:endParaRPr lang="en-GB"/>
           </a:p>
@@ -2171,7 +2171,7 @@
           <a:p>
             <a:fld id="{964343D4-4BE6-7741-AA6A-EBDD9EB5D27C}" type="datetimeFigureOut">
               <a:rPr lang="en-GB" smtClean="0"/>
-              <a:t>01/09/2023</a:t>
+              <a:t>04/09/2023</a:t>
             </a:fld>
             <a:endParaRPr lang="en-GB"/>
           </a:p>
@@ -2448,7 +2448,7 @@
           <a:p>
             <a:fld id="{964343D4-4BE6-7741-AA6A-EBDD9EB5D27C}" type="datetimeFigureOut">
               <a:rPr lang="en-GB" smtClean="0"/>
-              <a:t>01/09/2023</a:t>
+              <a:t>04/09/2023</a:t>
             </a:fld>
             <a:endParaRPr lang="en-GB"/>
           </a:p>
@@ -2705,7 +2705,7 @@
           <a:p>
             <a:fld id="{964343D4-4BE6-7741-AA6A-EBDD9EB5D27C}" type="datetimeFigureOut">
               <a:rPr lang="en-GB" smtClean="0"/>
-              <a:t>01/09/2023</a:t>
+              <a:t>04/09/2023</a:t>
             </a:fld>
             <a:endParaRPr lang="en-GB"/>
           </a:p>
@@ -2918,7 +2918,7 @@
           <a:p>
             <a:fld id="{964343D4-4BE6-7741-AA6A-EBDD9EB5D27C}" type="datetimeFigureOut">
               <a:rPr lang="en-GB" smtClean="0"/>
-              <a:t>01/09/2023</a:t>
+              <a:t>04/09/2023</a:t>
             </a:fld>
             <a:endParaRPr lang="en-GB"/>
           </a:p>
@@ -3557,7 +3557,7 @@
                 <a:ea typeface="CMU Serif" panose="02000603000000000000" pitchFamily="2" charset="0"/>
                 <a:cs typeface="CMU Serif" panose="02000603000000000000" pitchFamily="2" charset="0"/>
               </a:rPr>
-              <a:t>A Multivariate Multilevel Longitudinal Functional Model for Repeatedly-Observed Human-Movement Data</a:t>
+              <a:t>A Multivariate Multilevel Longitudinal Functional Model for Repeatedly Observed Human Movement Data</a:t>
             </a:r>
           </a:p>
         </p:txBody>

</xml_diff>